<commit_message>
Projektvortschritt&Präsi + Tobi Update 1.6
</commit_message>
<xml_diff>
--- a/Präsentation/24.03_16.30.pptx
+++ b/Präsentation/24.03_16.30.pptx
@@ -117,7 +117,169 @@
       </a:defRPr>
     </a:lvl9pPr>
   </p:defaultTextStyle>
+  <p:extLst>
+    <p:ext uri="{EFAFB233-063F-42B5-8137-9DF3F51BA10A}">
+      <p15:sldGuideLst xmlns:p15="http://schemas.microsoft.com/office/powerpoint/2012/main"/>
+    </p:ext>
+  </p:extLst>
 </p:presentation>
+</file>
+
+<file path=ppt/revisionInfo.xml><?xml version="1.0" encoding="utf-8"?>
+<p1510:revInfo xmlns:a="http://schemas.openxmlformats.org/drawingml/2006/main" xmlns:r="http://schemas.openxmlformats.org/officeDocument/2006/relationships" xmlns:p1510="http://schemas.microsoft.com/office/powerpoint/2015/10/main">
+  <p1510:revLst>
+    <p1510:client id="{AEEFFB20-2A16-4AEB-B661-DB9F230A74DB}" v="5" dt="2020-03-25T14:56:45.079"/>
+  </p1510:revLst>
+</p1510:revInfo>
+</file>
+
+<file path=ppt/changesInfos/changesInfo1.xml><?xml version="1.0" encoding="utf-8"?>
+<pc:chgInfo xmlns:a="http://schemas.openxmlformats.org/drawingml/2006/main" xmlns:r="http://schemas.openxmlformats.org/officeDocument/2006/relationships" xmlns:ac="http://schemas.microsoft.com/office/drawing/2013/main/command" xmlns:pc="http://schemas.microsoft.com/office/powerpoint/2013/main/command">
+  <pc:docChgLst>
+    <pc:chgData name="Tobias Schrottwieser" userId="023deaa1-c393-4577-b839-72b4ea2642d3" providerId="ADAL" clId="{AEEFFB20-2A16-4AEB-B661-DB9F230A74DB}"/>
+    <pc:docChg chg="custSel modSld">
+      <pc:chgData name="Tobias Schrottwieser" userId="023deaa1-c393-4577-b839-72b4ea2642d3" providerId="ADAL" clId="{AEEFFB20-2A16-4AEB-B661-DB9F230A74DB}" dt="2020-03-25T15:19:42.886" v="751" actId="20577"/>
+      <pc:docMkLst>
+        <pc:docMk/>
+      </pc:docMkLst>
+      <pc:sldChg chg="modSp mod">
+        <pc:chgData name="Tobias Schrottwieser" userId="023deaa1-c393-4577-b839-72b4ea2642d3" providerId="ADAL" clId="{AEEFFB20-2A16-4AEB-B661-DB9F230A74DB}" dt="2020-03-25T14:28:30.327" v="128" actId="20577"/>
+        <pc:sldMkLst>
+          <pc:docMk/>
+          <pc:sldMk cId="2460604619" sldId="257"/>
+        </pc:sldMkLst>
+        <pc:spChg chg="mod">
+          <ac:chgData name="Tobias Schrottwieser" userId="023deaa1-c393-4577-b839-72b4ea2642d3" providerId="ADAL" clId="{AEEFFB20-2A16-4AEB-B661-DB9F230A74DB}" dt="2020-03-25T14:28:30.327" v="128" actId="20577"/>
+          <ac:spMkLst>
+            <pc:docMk/>
+            <pc:sldMk cId="2460604619" sldId="257"/>
+            <ac:spMk id="4" creationId="{87BB428F-86CB-41F1-8660-E26754A11DC2}"/>
+          </ac:spMkLst>
+        </pc:spChg>
+      </pc:sldChg>
+      <pc:sldChg chg="modSp mod">
+        <pc:chgData name="Tobias Schrottwieser" userId="023deaa1-c393-4577-b839-72b4ea2642d3" providerId="ADAL" clId="{AEEFFB20-2A16-4AEB-B661-DB9F230A74DB}" dt="2020-03-25T15:18:41.687" v="723" actId="20577"/>
+        <pc:sldMkLst>
+          <pc:docMk/>
+          <pc:sldMk cId="1777675003" sldId="259"/>
+        </pc:sldMkLst>
+        <pc:spChg chg="mod">
+          <ac:chgData name="Tobias Schrottwieser" userId="023deaa1-c393-4577-b839-72b4ea2642d3" providerId="ADAL" clId="{AEEFFB20-2A16-4AEB-B661-DB9F230A74DB}" dt="2020-03-25T15:18:41.687" v="723" actId="20577"/>
+          <ac:spMkLst>
+            <pc:docMk/>
+            <pc:sldMk cId="1777675003" sldId="259"/>
+            <ac:spMk id="3" creationId="{1631B459-F19D-4852-9D15-6C38755CE086}"/>
+          </ac:spMkLst>
+        </pc:spChg>
+      </pc:sldChg>
+      <pc:sldChg chg="modSp mod">
+        <pc:chgData name="Tobias Schrottwieser" userId="023deaa1-c393-4577-b839-72b4ea2642d3" providerId="ADAL" clId="{AEEFFB20-2A16-4AEB-B661-DB9F230A74DB}" dt="2020-03-25T15:18:58.471" v="732" actId="313"/>
+        <pc:sldMkLst>
+          <pc:docMk/>
+          <pc:sldMk cId="1057808516" sldId="260"/>
+        </pc:sldMkLst>
+        <pc:spChg chg="mod">
+          <ac:chgData name="Tobias Schrottwieser" userId="023deaa1-c393-4577-b839-72b4ea2642d3" providerId="ADAL" clId="{AEEFFB20-2A16-4AEB-B661-DB9F230A74DB}" dt="2020-03-25T15:18:58.471" v="732" actId="313"/>
+          <ac:spMkLst>
+            <pc:docMk/>
+            <pc:sldMk cId="1057808516" sldId="260"/>
+            <ac:spMk id="3" creationId="{6B505FA2-DA71-4933-A86E-11B056C4ED99}"/>
+          </ac:spMkLst>
+        </pc:spChg>
+      </pc:sldChg>
+      <pc:sldChg chg="addSp modSp mod">
+        <pc:chgData name="Tobias Schrottwieser" userId="023deaa1-c393-4577-b839-72b4ea2642d3" providerId="ADAL" clId="{AEEFFB20-2A16-4AEB-B661-DB9F230A74DB}" dt="2020-03-25T15:19:42.886" v="751" actId="20577"/>
+        <pc:sldMkLst>
+          <pc:docMk/>
+          <pc:sldMk cId="2451457509" sldId="261"/>
+        </pc:sldMkLst>
+        <pc:spChg chg="add mod">
+          <ac:chgData name="Tobias Schrottwieser" userId="023deaa1-c393-4577-b839-72b4ea2642d3" providerId="ADAL" clId="{AEEFFB20-2A16-4AEB-B661-DB9F230A74DB}" dt="2020-03-25T15:19:42.886" v="751" actId="20577"/>
+          <ac:spMkLst>
+            <pc:docMk/>
+            <pc:sldMk cId="2451457509" sldId="261"/>
+            <ac:spMk id="5" creationId="{F2176D1F-AD08-4B7E-AB4D-CF289BF8DB65}"/>
+          </ac:spMkLst>
+        </pc:spChg>
+      </pc:sldChg>
+      <pc:sldChg chg="modSp mod">
+        <pc:chgData name="Tobias Schrottwieser" userId="023deaa1-c393-4577-b839-72b4ea2642d3" providerId="ADAL" clId="{AEEFFB20-2A16-4AEB-B661-DB9F230A74DB}" dt="2020-03-25T15:03:17.282" v="523" actId="20577"/>
+        <pc:sldMkLst>
+          <pc:docMk/>
+          <pc:sldMk cId="121267241" sldId="262"/>
+        </pc:sldMkLst>
+        <pc:graphicFrameChg chg="modGraphic">
+          <ac:chgData name="Tobias Schrottwieser" userId="023deaa1-c393-4577-b839-72b4ea2642d3" providerId="ADAL" clId="{AEEFFB20-2A16-4AEB-B661-DB9F230A74DB}" dt="2020-03-25T15:03:17.282" v="523" actId="20577"/>
+          <ac:graphicFrameMkLst>
+            <pc:docMk/>
+            <pc:sldMk cId="121267241" sldId="262"/>
+            <ac:graphicFrameMk id="4" creationId="{AB77C750-0EF6-4EC4-866E-6F0010E8BB32}"/>
+          </ac:graphicFrameMkLst>
+        </pc:graphicFrameChg>
+      </pc:sldChg>
+      <pc:sldChg chg="modSp mod">
+        <pc:chgData name="Tobias Schrottwieser" userId="023deaa1-c393-4577-b839-72b4ea2642d3" providerId="ADAL" clId="{AEEFFB20-2A16-4AEB-B661-DB9F230A74DB}" dt="2020-03-25T14:04:24.485" v="53" actId="20577"/>
+        <pc:sldMkLst>
+          <pc:docMk/>
+          <pc:sldMk cId="353619611" sldId="263"/>
+        </pc:sldMkLst>
+        <pc:spChg chg="mod">
+          <ac:chgData name="Tobias Schrottwieser" userId="023deaa1-c393-4577-b839-72b4ea2642d3" providerId="ADAL" clId="{AEEFFB20-2A16-4AEB-B661-DB9F230A74DB}" dt="2020-03-25T14:04:24.485" v="53" actId="20577"/>
+          <ac:spMkLst>
+            <pc:docMk/>
+            <pc:sldMk cId="353619611" sldId="263"/>
+            <ac:spMk id="3" creationId="{35F8909B-9D57-401C-89D3-32943BA6E84F}"/>
+          </ac:spMkLst>
+        </pc:spChg>
+      </pc:sldChg>
+      <pc:sldChg chg="modSp mod">
+        <pc:chgData name="Tobias Schrottwieser" userId="023deaa1-c393-4577-b839-72b4ea2642d3" providerId="ADAL" clId="{AEEFFB20-2A16-4AEB-B661-DB9F230A74DB}" dt="2020-03-25T15:14:13.868" v="676" actId="20577"/>
+        <pc:sldMkLst>
+          <pc:docMk/>
+          <pc:sldMk cId="2905441756" sldId="264"/>
+        </pc:sldMkLst>
+        <pc:graphicFrameChg chg="modGraphic">
+          <ac:chgData name="Tobias Schrottwieser" userId="023deaa1-c393-4577-b839-72b4ea2642d3" providerId="ADAL" clId="{AEEFFB20-2A16-4AEB-B661-DB9F230A74DB}" dt="2020-03-25T15:14:13.868" v="676" actId="20577"/>
+          <ac:graphicFrameMkLst>
+            <pc:docMk/>
+            <pc:sldMk cId="2905441756" sldId="264"/>
+            <ac:graphicFrameMk id="6" creationId="{EF804AD4-2197-4C90-A19C-0DF6CB977C24}"/>
+          </ac:graphicFrameMkLst>
+        </pc:graphicFrameChg>
+      </pc:sldChg>
+      <pc:sldChg chg="modSp mod">
+        <pc:chgData name="Tobias Schrottwieser" userId="023deaa1-c393-4577-b839-72b4ea2642d3" providerId="ADAL" clId="{AEEFFB20-2A16-4AEB-B661-DB9F230A74DB}" dt="2020-03-25T15:09:12.380" v="567" actId="20577"/>
+        <pc:sldMkLst>
+          <pc:docMk/>
+          <pc:sldMk cId="1086526111" sldId="265"/>
+        </pc:sldMkLst>
+        <pc:spChg chg="mod">
+          <ac:chgData name="Tobias Schrottwieser" userId="023deaa1-c393-4577-b839-72b4ea2642d3" providerId="ADAL" clId="{AEEFFB20-2A16-4AEB-B661-DB9F230A74DB}" dt="2020-03-25T15:09:12.380" v="567" actId="20577"/>
+          <ac:spMkLst>
+            <pc:docMk/>
+            <pc:sldMk cId="1086526111" sldId="265"/>
+            <ac:spMk id="3" creationId="{4EC943E2-6902-4F11-B224-AF7A53B57DC1}"/>
+          </ac:spMkLst>
+        </pc:spChg>
+      </pc:sldChg>
+      <pc:sldChg chg="modSp mod">
+        <pc:chgData name="Tobias Schrottwieser" userId="023deaa1-c393-4577-b839-72b4ea2642d3" providerId="ADAL" clId="{AEEFFB20-2A16-4AEB-B661-DB9F230A74DB}" dt="2020-03-25T15:10:38.456" v="573" actId="20577"/>
+        <pc:sldMkLst>
+          <pc:docMk/>
+          <pc:sldMk cId="192092431" sldId="266"/>
+        </pc:sldMkLst>
+        <pc:spChg chg="mod">
+          <ac:chgData name="Tobias Schrottwieser" userId="023deaa1-c393-4577-b839-72b4ea2642d3" providerId="ADAL" clId="{AEEFFB20-2A16-4AEB-B661-DB9F230A74DB}" dt="2020-03-25T15:10:38.456" v="573" actId="20577"/>
+          <ac:spMkLst>
+            <pc:docMk/>
+            <pc:sldMk cId="192092431" sldId="266"/>
+            <ac:spMk id="3" creationId="{0888D665-06E1-42BC-805F-50376A48A97F}"/>
+          </ac:spMkLst>
+        </pc:spChg>
+      </pc:sldChg>
+    </pc:docChg>
+  </pc:docChgLst>
+</pc:chgInfo>
 </file>
 
 <file path=ppt/notesMasters/notesMaster1.xml><?xml version="1.0" encoding="utf-8"?>
@@ -202,7 +364,7 @@
           <a:p>
             <a:fld id="{FA4E140B-FB69-475C-B1F5-19036C011D43}" type="datetimeFigureOut">
               <a:rPr lang="de-DE" smtClean="0"/>
-              <a:t>02.03.2020</a:t>
+              <a:t>25.03.2020</a:t>
             </a:fld>
             <a:endParaRPr lang="de-DE"/>
           </a:p>
@@ -718,7 +880,7 @@
           <a:noFill/>
           <a:extLst>
             <a:ext uri="{909E8E84-426E-40dd-AFC4-6F175D3DCCD1}">
-              <a14:hiddenFill xmlns:a14="http://schemas.microsoft.com/office/drawing/2010/main" xmlns="">
+              <a14:hiddenFill xmlns="" xmlns:a14="http://schemas.microsoft.com/office/drawing/2010/main">
                 <a:solidFill>
                   <a:srgbClr val="FFFFFF"/>
                 </a:solidFill>
@@ -777,7 +939,7 @@
             </a:ln>
             <a:extLst>
               <a:ext uri="{91240B29-F687-4f45-9708-019B960494DF}">
-                <a14:hiddenLine xmlns:a14="http://schemas.microsoft.com/office/drawing/2010/main" xmlns="" w="9525">
+                <a14:hiddenLine xmlns="" xmlns:a14="http://schemas.microsoft.com/office/drawing/2010/main" w="9525">
                   <a:solidFill>
                     <a:srgbClr val="000000"/>
                   </a:solidFill>
@@ -867,7 +1029,7 @@
             </a:ln>
             <a:extLst>
               <a:ext uri="{91240B29-F687-4f45-9708-019B960494DF}">
-                <a14:hiddenLine xmlns:a14="http://schemas.microsoft.com/office/drawing/2010/main" xmlns="" w="9525">
+                <a14:hiddenLine xmlns="" xmlns:a14="http://schemas.microsoft.com/office/drawing/2010/main" w="9525">
                   <a:solidFill>
                     <a:srgbClr val="000000"/>
                   </a:solidFill>
@@ -957,7 +1119,7 @@
             </a:ln>
             <a:extLst>
               <a:ext uri="{91240B29-F687-4f45-9708-019B960494DF}">
-                <a14:hiddenLine xmlns:a14="http://schemas.microsoft.com/office/drawing/2010/main" xmlns="" w="9525">
+                <a14:hiddenLine xmlns="" xmlns:a14="http://schemas.microsoft.com/office/drawing/2010/main" w="9525">
                   <a:solidFill>
                     <a:srgbClr val="000000"/>
                   </a:solidFill>
@@ -991,7 +1153,7 @@
             </a:ln>
             <a:extLst>
               <a:ext uri="{91240B29-F687-4f45-9708-019B960494DF}">
-                <a14:hiddenLine xmlns:a14="http://schemas.microsoft.com/office/drawing/2010/main" xmlns="" w="9525">
+                <a14:hiddenLine xmlns="" xmlns:a14="http://schemas.microsoft.com/office/drawing/2010/main" w="9525">
                   <a:solidFill>
                     <a:srgbClr val="000000"/>
                   </a:solidFill>
@@ -1081,7 +1243,7 @@
             </a:ln>
             <a:extLst>
               <a:ext uri="{91240B29-F687-4f45-9708-019B960494DF}">
-                <a14:hiddenLine xmlns:a14="http://schemas.microsoft.com/office/drawing/2010/main" xmlns="" w="9525">
+                <a14:hiddenLine xmlns="" xmlns:a14="http://schemas.microsoft.com/office/drawing/2010/main" w="9525">
                   <a:solidFill>
                     <a:srgbClr val="000000"/>
                   </a:solidFill>
@@ -1143,7 +1305,7 @@
             </a:ln>
             <a:extLst>
               <a:ext uri="{91240B29-F687-4f45-9708-019B960494DF}">
-                <a14:hiddenLine xmlns:a14="http://schemas.microsoft.com/office/drawing/2010/main" xmlns="" w="9525">
+                <a14:hiddenLine xmlns="" xmlns:a14="http://schemas.microsoft.com/office/drawing/2010/main" w="9525">
                   <a:solidFill>
                     <a:srgbClr val="000000"/>
                   </a:solidFill>
@@ -1205,7 +1367,7 @@
             </a:ln>
             <a:extLst>
               <a:ext uri="{91240B29-F687-4f45-9708-019B960494DF}">
-                <a14:hiddenLine xmlns:a14="http://schemas.microsoft.com/office/drawing/2010/main" xmlns="" w="9525">
+                <a14:hiddenLine xmlns="" xmlns:a14="http://schemas.microsoft.com/office/drawing/2010/main" w="9525">
                   <a:solidFill>
                     <a:srgbClr val="000000"/>
                   </a:solidFill>
@@ -1295,7 +1457,7 @@
             </a:ln>
             <a:extLst>
               <a:ext uri="{91240B29-F687-4f45-9708-019B960494DF}">
-                <a14:hiddenLine xmlns:a14="http://schemas.microsoft.com/office/drawing/2010/main" xmlns="" w="9525">
+                <a14:hiddenLine xmlns="" xmlns:a14="http://schemas.microsoft.com/office/drawing/2010/main" w="9525">
                   <a:solidFill>
                     <a:srgbClr val="000000"/>
                   </a:solidFill>
@@ -1357,7 +1519,7 @@
             </a:ln>
             <a:extLst>
               <a:ext uri="{91240B29-F687-4f45-9708-019B960494DF}">
-                <a14:hiddenLine xmlns:a14="http://schemas.microsoft.com/office/drawing/2010/main" xmlns="" w="9525">
+                <a14:hiddenLine xmlns="" xmlns:a14="http://schemas.microsoft.com/office/drawing/2010/main" w="9525">
                   <a:solidFill>
                     <a:srgbClr val="000000"/>
                   </a:solidFill>
@@ -1419,7 +1581,7 @@
             </a:ln>
             <a:extLst>
               <a:ext uri="{91240B29-F687-4f45-9708-019B960494DF}">
-                <a14:hiddenLine xmlns:a14="http://schemas.microsoft.com/office/drawing/2010/main" xmlns="" w="9525">
+                <a14:hiddenLine xmlns="" xmlns:a14="http://schemas.microsoft.com/office/drawing/2010/main" w="9525">
                   <a:solidFill>
                     <a:srgbClr val="000000"/>
                   </a:solidFill>
@@ -1509,7 +1671,7 @@
             </a:ln>
             <a:extLst>
               <a:ext uri="{91240B29-F687-4f45-9708-019B960494DF}">
-                <a14:hiddenLine xmlns:a14="http://schemas.microsoft.com/office/drawing/2010/main" xmlns="" w="9525">
+                <a14:hiddenLine xmlns="" xmlns:a14="http://schemas.microsoft.com/office/drawing/2010/main" w="9525">
                   <a:solidFill>
                     <a:srgbClr val="000000"/>
                   </a:solidFill>
@@ -1599,7 +1761,7 @@
             </a:ln>
             <a:extLst>
               <a:ext uri="{91240B29-F687-4f45-9708-019B960494DF}">
-                <a14:hiddenLine xmlns:a14="http://schemas.microsoft.com/office/drawing/2010/main" xmlns="" w="9525">
+                <a14:hiddenLine xmlns="" xmlns:a14="http://schemas.microsoft.com/office/drawing/2010/main" w="9525">
                   <a:solidFill>
                     <a:srgbClr val="000000"/>
                   </a:solidFill>
@@ -1661,7 +1823,7 @@
             </a:ln>
             <a:extLst>
               <a:ext uri="{91240B29-F687-4f45-9708-019B960494DF}">
-                <a14:hiddenLine xmlns:a14="http://schemas.microsoft.com/office/drawing/2010/main" xmlns="" w="9525">
+                <a14:hiddenLine xmlns="" xmlns:a14="http://schemas.microsoft.com/office/drawing/2010/main" w="9525">
                   <a:solidFill>
                     <a:srgbClr val="000000"/>
                   </a:solidFill>
@@ -1771,7 +1933,7 @@
             </a:ln>
             <a:extLst>
               <a:ext uri="{91240B29-F687-4f45-9708-019B960494DF}">
-                <a14:hiddenLine xmlns:a14="http://schemas.microsoft.com/office/drawing/2010/main" xmlns="" w="9525">
+                <a14:hiddenLine xmlns="" xmlns:a14="http://schemas.microsoft.com/office/drawing/2010/main" w="9525">
                   <a:solidFill>
                     <a:srgbClr val="000000"/>
                   </a:solidFill>
@@ -1833,7 +1995,7 @@
             </a:ln>
             <a:extLst>
               <a:ext uri="{91240B29-F687-4f45-9708-019B960494DF}">
-                <a14:hiddenLine xmlns:a14="http://schemas.microsoft.com/office/drawing/2010/main" xmlns="" w="9525">
+                <a14:hiddenLine xmlns="" xmlns:a14="http://schemas.microsoft.com/office/drawing/2010/main" w="9525">
                   <a:solidFill>
                     <a:srgbClr val="000000"/>
                   </a:solidFill>
@@ -1923,7 +2085,7 @@
             </a:ln>
             <a:extLst>
               <a:ext uri="{91240B29-F687-4f45-9708-019B960494DF}">
-                <a14:hiddenLine xmlns:a14="http://schemas.microsoft.com/office/drawing/2010/main" xmlns="" w="9525">
+                <a14:hiddenLine xmlns="" xmlns:a14="http://schemas.microsoft.com/office/drawing/2010/main" w="9525">
                   <a:solidFill>
                     <a:srgbClr val="000000"/>
                   </a:solidFill>
@@ -2013,7 +2175,7 @@
             </a:ln>
             <a:extLst>
               <a:ext uri="{91240B29-F687-4f45-9708-019B960494DF}">
-                <a14:hiddenLine xmlns:a14="http://schemas.microsoft.com/office/drawing/2010/main" xmlns="" w="9525">
+                <a14:hiddenLine xmlns="" xmlns:a14="http://schemas.microsoft.com/office/drawing/2010/main" w="9525">
                   <a:solidFill>
                     <a:srgbClr val="000000"/>
                   </a:solidFill>
@@ -2075,7 +2237,7 @@
             </a:ln>
             <a:extLst>
               <a:ext uri="{91240B29-F687-4f45-9708-019B960494DF}">
-                <a14:hiddenLine xmlns:a14="http://schemas.microsoft.com/office/drawing/2010/main" xmlns="" w="9525">
+                <a14:hiddenLine xmlns="" xmlns:a14="http://schemas.microsoft.com/office/drawing/2010/main" w="9525">
                   <a:solidFill>
                     <a:srgbClr val="000000"/>
                   </a:solidFill>
@@ -2165,7 +2327,7 @@
             </a:ln>
             <a:extLst>
               <a:ext uri="{91240B29-F687-4f45-9708-019B960494DF}">
-                <a14:hiddenLine xmlns:a14="http://schemas.microsoft.com/office/drawing/2010/main" xmlns="" w="9525">
+                <a14:hiddenLine xmlns="" xmlns:a14="http://schemas.microsoft.com/office/drawing/2010/main" w="9525">
                   <a:solidFill>
                     <a:srgbClr val="000000"/>
                   </a:solidFill>
@@ -2255,7 +2417,7 @@
             </a:ln>
             <a:extLst>
               <a:ext uri="{91240B29-F687-4f45-9708-019B960494DF}">
-                <a14:hiddenLine xmlns:a14="http://schemas.microsoft.com/office/drawing/2010/main" xmlns="" w="9525">
+                <a14:hiddenLine xmlns="" xmlns:a14="http://schemas.microsoft.com/office/drawing/2010/main" w="9525">
                   <a:solidFill>
                     <a:srgbClr val="000000"/>
                   </a:solidFill>
@@ -2311,7 +2473,7 @@
             </a:ln>
             <a:extLst>
               <a:ext uri="{91240B29-F687-4f45-9708-019B960494DF}">
-                <a14:hiddenLine xmlns:a14="http://schemas.microsoft.com/office/drawing/2010/main" xmlns="" w="9525">
+                <a14:hiddenLine xmlns="" xmlns:a14="http://schemas.microsoft.com/office/drawing/2010/main" w="9525">
                   <a:solidFill>
                     <a:srgbClr val="000000"/>
                   </a:solidFill>
@@ -2401,7 +2563,7 @@
             </a:ln>
             <a:extLst>
               <a:ext uri="{91240B29-F687-4f45-9708-019B960494DF}">
-                <a14:hiddenLine xmlns:a14="http://schemas.microsoft.com/office/drawing/2010/main" xmlns="" w="9525">
+                <a14:hiddenLine xmlns="" xmlns:a14="http://schemas.microsoft.com/office/drawing/2010/main" w="9525">
                   <a:solidFill>
                     <a:srgbClr val="000000"/>
                   </a:solidFill>
@@ -2457,7 +2619,7 @@
             </a:ln>
             <a:extLst>
               <a:ext uri="{91240B29-F687-4f45-9708-019B960494DF}">
-                <a14:hiddenLine xmlns:a14="http://schemas.microsoft.com/office/drawing/2010/main" xmlns="" w="9525">
+                <a14:hiddenLine xmlns="" xmlns:a14="http://schemas.microsoft.com/office/drawing/2010/main" w="9525">
                   <a:solidFill>
                     <a:srgbClr val="000000"/>
                   </a:solidFill>
@@ -2547,7 +2709,7 @@
             </a:ln>
             <a:extLst>
               <a:ext uri="{91240B29-F687-4f45-9708-019B960494DF}">
-                <a14:hiddenLine xmlns:a14="http://schemas.microsoft.com/office/drawing/2010/main" xmlns="" w="9525">
+                <a14:hiddenLine xmlns="" xmlns:a14="http://schemas.microsoft.com/office/drawing/2010/main" w="9525">
                   <a:solidFill>
                     <a:srgbClr val="000000"/>
                   </a:solidFill>
@@ -2615,7 +2777,7 @@
             </a:ln>
             <a:extLst>
               <a:ext uri="{91240B29-F687-4f45-9708-019B960494DF}">
-                <a14:hiddenLine xmlns:a14="http://schemas.microsoft.com/office/drawing/2010/main" xmlns="" w="9525">
+                <a14:hiddenLine xmlns="" xmlns:a14="http://schemas.microsoft.com/office/drawing/2010/main" w="9525">
                   <a:solidFill>
                     <a:srgbClr val="000000"/>
                   </a:solidFill>
@@ -2705,7 +2867,7 @@
             </a:ln>
             <a:extLst>
               <a:ext uri="{91240B29-F687-4f45-9708-019B960494DF}">
-                <a14:hiddenLine xmlns:a14="http://schemas.microsoft.com/office/drawing/2010/main" xmlns="" w="9525">
+                <a14:hiddenLine xmlns="" xmlns:a14="http://schemas.microsoft.com/office/drawing/2010/main" w="9525">
                   <a:solidFill>
                     <a:srgbClr val="000000"/>
                   </a:solidFill>
@@ -2773,7 +2935,7 @@
             </a:ln>
             <a:extLst>
               <a:ext uri="{91240B29-F687-4f45-9708-019B960494DF}">
-                <a14:hiddenLine xmlns:a14="http://schemas.microsoft.com/office/drawing/2010/main" xmlns="" w="9525">
+                <a14:hiddenLine xmlns="" xmlns:a14="http://schemas.microsoft.com/office/drawing/2010/main" w="9525">
                   <a:solidFill>
                     <a:srgbClr val="000000"/>
                   </a:solidFill>
@@ -2863,7 +3025,7 @@
             </a:ln>
             <a:extLst>
               <a:ext uri="{91240B29-F687-4f45-9708-019B960494DF}">
-                <a14:hiddenLine xmlns:a14="http://schemas.microsoft.com/office/drawing/2010/main" xmlns="" w="9525">
+                <a14:hiddenLine xmlns="" xmlns:a14="http://schemas.microsoft.com/office/drawing/2010/main" w="9525">
                   <a:solidFill>
                     <a:srgbClr val="000000"/>
                   </a:solidFill>
@@ -2897,7 +3059,7 @@
             </a:ln>
             <a:extLst>
               <a:ext uri="{91240B29-F687-4f45-9708-019B960494DF}">
-                <a14:hiddenLine xmlns:a14="http://schemas.microsoft.com/office/drawing/2010/main" xmlns="" w="9525">
+                <a14:hiddenLine xmlns="" xmlns:a14="http://schemas.microsoft.com/office/drawing/2010/main" w="9525">
                   <a:solidFill>
                     <a:srgbClr val="000000"/>
                   </a:solidFill>
@@ -2987,7 +3149,7 @@
             </a:ln>
             <a:extLst>
               <a:ext uri="{91240B29-F687-4f45-9708-019B960494DF}">
-                <a14:hiddenLine xmlns:a14="http://schemas.microsoft.com/office/drawing/2010/main" xmlns="" w="9525">
+                <a14:hiddenLine xmlns="" xmlns:a14="http://schemas.microsoft.com/office/drawing/2010/main" w="9525">
                   <a:solidFill>
                     <a:srgbClr val="000000"/>
                   </a:solidFill>
@@ -3049,7 +3211,7 @@
             </a:ln>
             <a:extLst>
               <a:ext uri="{91240B29-F687-4f45-9708-019B960494DF}">
-                <a14:hiddenLine xmlns:a14="http://schemas.microsoft.com/office/drawing/2010/main" xmlns="" w="9525">
+                <a14:hiddenLine xmlns="" xmlns:a14="http://schemas.microsoft.com/office/drawing/2010/main" w="9525">
                   <a:solidFill>
                     <a:srgbClr val="000000"/>
                   </a:solidFill>
@@ -3111,7 +3273,7 @@
             </a:ln>
             <a:extLst>
               <a:ext uri="{91240B29-F687-4f45-9708-019B960494DF}">
-                <a14:hiddenLine xmlns:a14="http://schemas.microsoft.com/office/drawing/2010/main" xmlns="" w="9525">
+                <a14:hiddenLine xmlns="" xmlns:a14="http://schemas.microsoft.com/office/drawing/2010/main" w="9525">
                   <a:solidFill>
                     <a:srgbClr val="000000"/>
                   </a:solidFill>
@@ -3201,7 +3363,7 @@
             </a:ln>
             <a:extLst>
               <a:ext uri="{91240B29-F687-4f45-9708-019B960494DF}">
-                <a14:hiddenLine xmlns:a14="http://schemas.microsoft.com/office/drawing/2010/main" xmlns="" w="9525">
+                <a14:hiddenLine xmlns="" xmlns:a14="http://schemas.microsoft.com/office/drawing/2010/main" w="9525">
                   <a:solidFill>
                     <a:srgbClr val="000000"/>
                   </a:solidFill>
@@ -3269,7 +3431,7 @@
             </a:ln>
             <a:extLst>
               <a:ext uri="{91240B29-F687-4f45-9708-019B960494DF}">
-                <a14:hiddenLine xmlns:a14="http://schemas.microsoft.com/office/drawing/2010/main" xmlns="" w="9525">
+                <a14:hiddenLine xmlns="" xmlns:a14="http://schemas.microsoft.com/office/drawing/2010/main" w="9525">
                   <a:solidFill>
                     <a:srgbClr val="000000"/>
                   </a:solidFill>
@@ -3331,7 +3493,7 @@
             </a:ln>
             <a:extLst>
               <a:ext uri="{91240B29-F687-4f45-9708-019B960494DF}">
-                <a14:hiddenLine xmlns:a14="http://schemas.microsoft.com/office/drawing/2010/main" xmlns="" w="9525">
+                <a14:hiddenLine xmlns="" xmlns:a14="http://schemas.microsoft.com/office/drawing/2010/main" w="9525">
                   <a:solidFill>
                     <a:srgbClr val="000000"/>
                   </a:solidFill>
@@ -3421,7 +3583,7 @@
             </a:ln>
             <a:extLst>
               <a:ext uri="{91240B29-F687-4f45-9708-019B960494DF}">
-                <a14:hiddenLine xmlns:a14="http://schemas.microsoft.com/office/drawing/2010/main" xmlns="" w="9525">
+                <a14:hiddenLine xmlns="" xmlns:a14="http://schemas.microsoft.com/office/drawing/2010/main" w="9525">
                   <a:solidFill>
                     <a:srgbClr val="000000"/>
                   </a:solidFill>
@@ -3483,7 +3645,7 @@
             </a:ln>
             <a:extLst>
               <a:ext uri="{91240B29-F687-4f45-9708-019B960494DF}">
-                <a14:hiddenLine xmlns:a14="http://schemas.microsoft.com/office/drawing/2010/main" xmlns="" w="9525">
+                <a14:hiddenLine xmlns="" xmlns:a14="http://schemas.microsoft.com/office/drawing/2010/main" w="9525">
                   <a:solidFill>
                     <a:srgbClr val="000000"/>
                   </a:solidFill>
@@ -3573,7 +3735,7 @@
             </a:ln>
             <a:extLst>
               <a:ext uri="{91240B29-F687-4f45-9708-019B960494DF}">
-                <a14:hiddenLine xmlns:a14="http://schemas.microsoft.com/office/drawing/2010/main" xmlns="" w="9525">
+                <a14:hiddenLine xmlns="" xmlns:a14="http://schemas.microsoft.com/office/drawing/2010/main" w="9525">
                   <a:solidFill>
                     <a:srgbClr val="000000"/>
                   </a:solidFill>
@@ -3635,7 +3797,7 @@
             </a:ln>
             <a:extLst>
               <a:ext uri="{91240B29-F687-4f45-9708-019B960494DF}">
-                <a14:hiddenLine xmlns:a14="http://schemas.microsoft.com/office/drawing/2010/main" xmlns="" w="9525">
+                <a14:hiddenLine xmlns="" xmlns:a14="http://schemas.microsoft.com/office/drawing/2010/main" w="9525">
                   <a:solidFill>
                     <a:srgbClr val="000000"/>
                   </a:solidFill>
@@ -3725,7 +3887,7 @@
             </a:ln>
             <a:extLst>
               <a:ext uri="{91240B29-F687-4f45-9708-019B960494DF}">
-                <a14:hiddenLine xmlns:a14="http://schemas.microsoft.com/office/drawing/2010/main" xmlns="" w="9525">
+                <a14:hiddenLine xmlns="" xmlns:a14="http://schemas.microsoft.com/office/drawing/2010/main" w="9525">
                   <a:solidFill>
                     <a:srgbClr val="000000"/>
                   </a:solidFill>
@@ -3759,7 +3921,7 @@
             </a:ln>
             <a:extLst>
               <a:ext uri="{91240B29-F687-4f45-9708-019B960494DF}">
-                <a14:hiddenLine xmlns:a14="http://schemas.microsoft.com/office/drawing/2010/main" xmlns="" w="9525">
+                <a14:hiddenLine xmlns="" xmlns:a14="http://schemas.microsoft.com/office/drawing/2010/main" w="9525">
                   <a:solidFill>
                     <a:srgbClr val="000000"/>
                   </a:solidFill>
@@ -3824,7 +3986,7 @@
             </a:ln>
             <a:extLst>
               <a:ext uri="{91240B29-F687-4f45-9708-019B960494DF}">
-                <a14:hiddenLine xmlns:a14="http://schemas.microsoft.com/office/drawing/2010/main" xmlns="" w="9525">
+                <a14:hiddenLine xmlns="" xmlns:a14="http://schemas.microsoft.com/office/drawing/2010/main" w="9525">
                   <a:solidFill>
                     <a:srgbClr val="000000"/>
                   </a:solidFill>
@@ -3914,7 +4076,7 @@
             </a:ln>
             <a:extLst>
               <a:ext uri="{91240B29-F687-4f45-9708-019B960494DF}">
-                <a14:hiddenLine xmlns:a14="http://schemas.microsoft.com/office/drawing/2010/main" xmlns="" w="9525">
+                <a14:hiddenLine xmlns="" xmlns:a14="http://schemas.microsoft.com/office/drawing/2010/main" w="9525">
                   <a:solidFill>
                     <a:srgbClr val="000000"/>
                   </a:solidFill>
@@ -3976,7 +4138,7 @@
             </a:ln>
             <a:extLst>
               <a:ext uri="{91240B29-F687-4f45-9708-019B960494DF}">
-                <a14:hiddenLine xmlns:a14="http://schemas.microsoft.com/office/drawing/2010/main" xmlns="" w="9525">
+                <a14:hiddenLine xmlns="" xmlns:a14="http://schemas.microsoft.com/office/drawing/2010/main" w="9525">
                   <a:solidFill>
                     <a:srgbClr val="000000"/>
                   </a:solidFill>
@@ -4066,7 +4228,7 @@
             </a:ln>
             <a:extLst>
               <a:ext uri="{91240B29-F687-4f45-9708-019B960494DF}">
-                <a14:hiddenLine xmlns:a14="http://schemas.microsoft.com/office/drawing/2010/main" xmlns="" w="9525">
+                <a14:hiddenLine xmlns="" xmlns:a14="http://schemas.microsoft.com/office/drawing/2010/main" w="9525">
                   <a:solidFill>
                     <a:srgbClr val="000000"/>
                   </a:solidFill>
@@ -4156,7 +4318,7 @@
             </a:ln>
             <a:extLst>
               <a:ext uri="{91240B29-F687-4f45-9708-019B960494DF}">
-                <a14:hiddenLine xmlns:a14="http://schemas.microsoft.com/office/drawing/2010/main" xmlns="" w="9525">
+                <a14:hiddenLine xmlns="" xmlns:a14="http://schemas.microsoft.com/office/drawing/2010/main" w="9525">
                   <a:solidFill>
                     <a:srgbClr val="000000"/>
                   </a:solidFill>
@@ -4221,7 +4383,7 @@
             </a:ln>
             <a:extLst>
               <a:ext uri="{91240B29-F687-4f45-9708-019B960494DF}">
-                <a14:hiddenLine xmlns:a14="http://schemas.microsoft.com/office/drawing/2010/main" xmlns="" w="9525">
+                <a14:hiddenLine xmlns="" xmlns:a14="http://schemas.microsoft.com/office/drawing/2010/main" w="9525">
                   <a:solidFill>
                     <a:srgbClr val="000000"/>
                   </a:solidFill>
@@ -4283,7 +4445,7 @@
             </a:ln>
             <a:extLst>
               <a:ext uri="{91240B29-F687-4f45-9708-019B960494DF}">
-                <a14:hiddenLine xmlns:a14="http://schemas.microsoft.com/office/drawing/2010/main" xmlns="" w="9525">
+                <a14:hiddenLine xmlns="" xmlns:a14="http://schemas.microsoft.com/office/drawing/2010/main" w="9525">
                   <a:solidFill>
                     <a:srgbClr val="000000"/>
                   </a:solidFill>
@@ -4373,7 +4535,7 @@
             </a:ln>
             <a:extLst>
               <a:ext uri="{91240B29-F687-4f45-9708-019B960494DF}">
-                <a14:hiddenLine xmlns:a14="http://schemas.microsoft.com/office/drawing/2010/main" xmlns="" w="9525">
+                <a14:hiddenLine xmlns="" xmlns:a14="http://schemas.microsoft.com/office/drawing/2010/main" w="9525">
                   <a:solidFill>
                     <a:srgbClr val="000000"/>
                   </a:solidFill>
@@ -4463,7 +4625,7 @@
             </a:ln>
             <a:extLst>
               <a:ext uri="{91240B29-F687-4f45-9708-019B960494DF}">
-                <a14:hiddenLine xmlns:a14="http://schemas.microsoft.com/office/drawing/2010/main" xmlns="" w="9525">
+                <a14:hiddenLine xmlns="" xmlns:a14="http://schemas.microsoft.com/office/drawing/2010/main" w="9525">
                   <a:solidFill>
                     <a:srgbClr val="000000"/>
                   </a:solidFill>
@@ -4525,7 +4687,7 @@
             </a:ln>
             <a:extLst>
               <a:ext uri="{91240B29-F687-4f45-9708-019B960494DF}">
-                <a14:hiddenLine xmlns:a14="http://schemas.microsoft.com/office/drawing/2010/main" xmlns="" w="9525">
+                <a14:hiddenLine xmlns="" xmlns:a14="http://schemas.microsoft.com/office/drawing/2010/main" w="9525">
                   <a:solidFill>
                     <a:srgbClr val="000000"/>
                   </a:solidFill>
@@ -4645,7 +4807,7 @@
             </a:ln>
             <a:extLst>
               <a:ext uri="{91240B29-F687-4f45-9708-019B960494DF}">
-                <a14:hiddenLine xmlns:a14="http://schemas.microsoft.com/office/drawing/2010/main" xmlns="" w="9525">
+                <a14:hiddenLine xmlns="" xmlns:a14="http://schemas.microsoft.com/office/drawing/2010/main" w="9525">
                   <a:solidFill>
                     <a:srgbClr val="000000"/>
                   </a:solidFill>
@@ -4713,7 +4875,7 @@
             </a:ln>
             <a:extLst>
               <a:ext uri="{91240B29-F687-4f45-9708-019B960494DF}">
-                <a14:hiddenLine xmlns:a14="http://schemas.microsoft.com/office/drawing/2010/main" xmlns="" w="9525">
+                <a14:hiddenLine xmlns="" xmlns:a14="http://schemas.microsoft.com/office/drawing/2010/main" w="9525">
                   <a:solidFill>
                     <a:srgbClr val="000000"/>
                   </a:solidFill>
@@ -4803,7 +4965,7 @@
             </a:ln>
             <a:extLst>
               <a:ext uri="{91240B29-F687-4f45-9708-019B960494DF}">
-                <a14:hiddenLine xmlns:a14="http://schemas.microsoft.com/office/drawing/2010/main" xmlns="" w="9525">
+                <a14:hiddenLine xmlns="" xmlns:a14="http://schemas.microsoft.com/office/drawing/2010/main" w="9525">
                   <a:solidFill>
                     <a:srgbClr val="000000"/>
                   </a:solidFill>
@@ -4943,7 +5105,7 @@
           <a:p>
             <a:fld id="{D29DBA72-526C-40C7-B231-DFAA8CD27BC6}" type="datetimeFigureOut">
               <a:rPr lang="de-DE" smtClean="0"/>
-              <a:t>02.03.2020</a:t>
+              <a:t>25.03.2020</a:t>
             </a:fld>
             <a:endParaRPr lang="de-DE"/>
           </a:p>
@@ -5210,7 +5372,7 @@
           <a:p>
             <a:fld id="{D29DBA72-526C-40C7-B231-DFAA8CD27BC6}" type="datetimeFigureOut">
               <a:rPr lang="de-DE" smtClean="0"/>
-              <a:t>02.03.2020</a:t>
+              <a:t>25.03.2020</a:t>
             </a:fld>
             <a:endParaRPr lang="de-DE"/>
           </a:p>
@@ -5406,7 +5568,7 @@
           <a:p>
             <a:fld id="{D29DBA72-526C-40C7-B231-DFAA8CD27BC6}" type="datetimeFigureOut">
               <a:rPr lang="de-DE" smtClean="0"/>
-              <a:t>02.03.2020</a:t>
+              <a:t>25.03.2020</a:t>
             </a:fld>
             <a:endParaRPr lang="de-DE"/>
           </a:p>
@@ -5669,7 +5831,7 @@
           <a:p>
             <a:fld id="{D29DBA72-526C-40C7-B231-DFAA8CD27BC6}" type="datetimeFigureOut">
               <a:rPr lang="de-DE" smtClean="0"/>
-              <a:t>02.03.2020</a:t>
+              <a:t>25.03.2020</a:t>
             </a:fld>
             <a:endParaRPr lang="de-DE"/>
           </a:p>
@@ -6103,7 +6265,7 @@
           <a:p>
             <a:fld id="{D29DBA72-526C-40C7-B231-DFAA8CD27BC6}" type="datetimeFigureOut">
               <a:rPr lang="de-DE" smtClean="0"/>
-              <a:t>02.03.2020</a:t>
+              <a:t>25.03.2020</a:t>
             </a:fld>
             <a:endParaRPr lang="de-DE"/>
           </a:p>
@@ -6649,7 +6811,7 @@
           <a:p>
             <a:fld id="{D29DBA72-526C-40C7-B231-DFAA8CD27BC6}" type="datetimeFigureOut">
               <a:rPr lang="de-DE" smtClean="0"/>
-              <a:t>02.03.2020</a:t>
+              <a:t>25.03.2020</a:t>
             </a:fld>
             <a:endParaRPr lang="de-DE"/>
           </a:p>
@@ -7369,7 +7531,7 @@
           <a:p>
             <a:fld id="{D29DBA72-526C-40C7-B231-DFAA8CD27BC6}" type="datetimeFigureOut">
               <a:rPr lang="de-DE" smtClean="0"/>
-              <a:t>02.03.2020</a:t>
+              <a:t>25.03.2020</a:t>
             </a:fld>
             <a:endParaRPr lang="de-DE"/>
           </a:p>
@@ -7539,7 +7701,7 @@
           <a:p>
             <a:fld id="{D29DBA72-526C-40C7-B231-DFAA8CD27BC6}" type="datetimeFigureOut">
               <a:rPr lang="de-DE" smtClean="0"/>
-              <a:t>02.03.2020</a:t>
+              <a:t>25.03.2020</a:t>
             </a:fld>
             <a:endParaRPr lang="de-DE"/>
           </a:p>
@@ -7719,7 +7881,7 @@
           <a:p>
             <a:fld id="{D29DBA72-526C-40C7-B231-DFAA8CD27BC6}" type="datetimeFigureOut">
               <a:rPr lang="de-DE" smtClean="0"/>
-              <a:t>02.03.2020</a:t>
+              <a:t>25.03.2020</a:t>
             </a:fld>
             <a:endParaRPr lang="de-DE"/>
           </a:p>
@@ -7889,7 +8051,7 @@
           <a:p>
             <a:fld id="{D29DBA72-526C-40C7-B231-DFAA8CD27BC6}" type="datetimeFigureOut">
               <a:rPr lang="de-DE" smtClean="0"/>
-              <a:t>02.03.2020</a:t>
+              <a:t>25.03.2020</a:t>
             </a:fld>
             <a:endParaRPr lang="de-DE"/>
           </a:p>
@@ -8139,7 +8301,7 @@
           <a:p>
             <a:fld id="{D29DBA72-526C-40C7-B231-DFAA8CD27BC6}" type="datetimeFigureOut">
               <a:rPr lang="de-DE" smtClean="0"/>
-              <a:t>02.03.2020</a:t>
+              <a:t>25.03.2020</a:t>
             </a:fld>
             <a:endParaRPr lang="de-DE"/>
           </a:p>
@@ -8371,7 +8533,7 @@
           <a:p>
             <a:fld id="{D29DBA72-526C-40C7-B231-DFAA8CD27BC6}" type="datetimeFigureOut">
               <a:rPr lang="de-DE" smtClean="0"/>
-              <a:t>02.03.2020</a:t>
+              <a:t>25.03.2020</a:t>
             </a:fld>
             <a:endParaRPr lang="de-DE"/>
           </a:p>
@@ -8752,7 +8914,7 @@
           <a:p>
             <a:fld id="{D29DBA72-526C-40C7-B231-DFAA8CD27BC6}" type="datetimeFigureOut">
               <a:rPr lang="de-DE" smtClean="0"/>
-              <a:t>02.03.2020</a:t>
+              <a:t>25.03.2020</a:t>
             </a:fld>
             <a:endParaRPr lang="de-DE"/>
           </a:p>
@@ -8870,7 +9032,7 @@
           <a:p>
             <a:fld id="{D29DBA72-526C-40C7-B231-DFAA8CD27BC6}" type="datetimeFigureOut">
               <a:rPr lang="de-DE" smtClean="0"/>
-              <a:t>02.03.2020</a:t>
+              <a:t>25.03.2020</a:t>
             </a:fld>
             <a:endParaRPr lang="de-DE"/>
           </a:p>
@@ -8965,7 +9127,7 @@
           <a:p>
             <a:fld id="{D29DBA72-526C-40C7-B231-DFAA8CD27BC6}" type="datetimeFigureOut">
               <a:rPr lang="de-DE" smtClean="0"/>
-              <a:t>02.03.2020</a:t>
+              <a:t>25.03.2020</a:t>
             </a:fld>
             <a:endParaRPr lang="de-DE"/>
           </a:p>
@@ -9214,7 +9376,7 @@
           <a:p>
             <a:fld id="{D29DBA72-526C-40C7-B231-DFAA8CD27BC6}" type="datetimeFigureOut">
               <a:rPr lang="de-DE" smtClean="0"/>
-              <a:t>02.03.2020</a:t>
+              <a:t>25.03.2020</a:t>
             </a:fld>
             <a:endParaRPr lang="de-DE"/>
           </a:p>
@@ -9494,7 +9656,7 @@
           <a:p>
             <a:fld id="{D29DBA72-526C-40C7-B231-DFAA8CD27BC6}" type="datetimeFigureOut">
               <a:rPr lang="de-DE" smtClean="0"/>
-              <a:t>02.03.2020</a:t>
+              <a:t>25.03.2020</a:t>
             </a:fld>
             <a:endParaRPr lang="de-DE"/>
           </a:p>
@@ -9617,7 +9779,7 @@
           <a:noFill/>
           <a:extLst>
             <a:ext uri="{909E8E84-426E-40dd-AFC4-6F175D3DCCD1}">
-              <a14:hiddenFill xmlns:a14="http://schemas.microsoft.com/office/drawing/2010/main" xmlns="">
+              <a14:hiddenFill xmlns="" xmlns:a14="http://schemas.microsoft.com/office/drawing/2010/main">
                 <a:solidFill>
                   <a:srgbClr val="FFFFFF"/>
                 </a:solidFill>
@@ -9691,7 +9853,7 @@
               </a:ln>
               <a:extLst>
                 <a:ext uri="{91240B29-F687-4f45-9708-019B960494DF}">
-                  <a14:hiddenLine xmlns:a14="http://schemas.microsoft.com/office/drawing/2010/main" xmlns="" w="9525">
+                  <a14:hiddenLine xmlns="" xmlns:a14="http://schemas.microsoft.com/office/drawing/2010/main" w="9525">
                     <a:solidFill>
                       <a:srgbClr val="000000"/>
                     </a:solidFill>
@@ -9781,7 +9943,7 @@
               </a:ln>
               <a:extLst>
                 <a:ext uri="{91240B29-F687-4f45-9708-019B960494DF}">
-                  <a14:hiddenLine xmlns:a14="http://schemas.microsoft.com/office/drawing/2010/main" xmlns="" w="9525">
+                  <a14:hiddenLine xmlns="" xmlns:a14="http://schemas.microsoft.com/office/drawing/2010/main" w="9525">
                     <a:solidFill>
                       <a:srgbClr val="000000"/>
                     </a:solidFill>
@@ -9871,7 +10033,7 @@
               </a:ln>
               <a:extLst>
                 <a:ext uri="{91240B29-F687-4f45-9708-019B960494DF}">
-                  <a14:hiddenLine xmlns:a14="http://schemas.microsoft.com/office/drawing/2010/main" xmlns="" w="9525">
+                  <a14:hiddenLine xmlns="" xmlns:a14="http://schemas.microsoft.com/office/drawing/2010/main" w="9525">
                     <a:solidFill>
                       <a:srgbClr val="000000"/>
                     </a:solidFill>
@@ -9933,7 +10095,7 @@
               </a:ln>
               <a:extLst>
                 <a:ext uri="{91240B29-F687-4f45-9708-019B960494DF}">
-                  <a14:hiddenLine xmlns:a14="http://schemas.microsoft.com/office/drawing/2010/main" xmlns="" w="9525">
+                  <a14:hiddenLine xmlns="" xmlns:a14="http://schemas.microsoft.com/office/drawing/2010/main" w="9525">
                     <a:solidFill>
                       <a:srgbClr val="000000"/>
                     </a:solidFill>
@@ -10023,7 +10185,7 @@
               </a:ln>
               <a:extLst>
                 <a:ext uri="{91240B29-F687-4f45-9708-019B960494DF}">
-                  <a14:hiddenLine xmlns:a14="http://schemas.microsoft.com/office/drawing/2010/main" xmlns="" w="9525">
+                  <a14:hiddenLine xmlns="" xmlns:a14="http://schemas.microsoft.com/office/drawing/2010/main" w="9525">
                     <a:solidFill>
                       <a:srgbClr val="000000"/>
                     </a:solidFill>
@@ -10085,7 +10247,7 @@
               </a:ln>
               <a:extLst>
                 <a:ext uri="{91240B29-F687-4f45-9708-019B960494DF}">
-                  <a14:hiddenLine xmlns:a14="http://schemas.microsoft.com/office/drawing/2010/main" xmlns="" w="9525">
+                  <a14:hiddenLine xmlns="" xmlns:a14="http://schemas.microsoft.com/office/drawing/2010/main" w="9525">
                     <a:solidFill>
                       <a:srgbClr val="000000"/>
                     </a:solidFill>
@@ -10147,7 +10309,7 @@
               </a:ln>
               <a:extLst>
                 <a:ext uri="{91240B29-F687-4f45-9708-019B960494DF}">
-                  <a14:hiddenLine xmlns:a14="http://schemas.microsoft.com/office/drawing/2010/main" xmlns="" w="9525">
+                  <a14:hiddenLine xmlns="" xmlns:a14="http://schemas.microsoft.com/office/drawing/2010/main" w="9525">
                     <a:solidFill>
                       <a:srgbClr val="000000"/>
                     </a:solidFill>
@@ -10237,7 +10399,7 @@
               </a:ln>
               <a:extLst>
                 <a:ext uri="{91240B29-F687-4f45-9708-019B960494DF}">
-                  <a14:hiddenLine xmlns:a14="http://schemas.microsoft.com/office/drawing/2010/main" xmlns="" w="9525">
+                  <a14:hiddenLine xmlns="" xmlns:a14="http://schemas.microsoft.com/office/drawing/2010/main" w="9525">
                     <a:solidFill>
                       <a:srgbClr val="000000"/>
                     </a:solidFill>
@@ -10327,7 +10489,7 @@
               </a:ln>
               <a:extLst>
                 <a:ext uri="{91240B29-F687-4f45-9708-019B960494DF}">
-                  <a14:hiddenLine xmlns:a14="http://schemas.microsoft.com/office/drawing/2010/main" xmlns="" w="9525">
+                  <a14:hiddenLine xmlns="" xmlns:a14="http://schemas.microsoft.com/office/drawing/2010/main" w="9525">
                     <a:solidFill>
                       <a:srgbClr val="000000"/>
                     </a:solidFill>
@@ -10389,7 +10551,7 @@
               </a:ln>
               <a:extLst>
                 <a:ext uri="{91240B29-F687-4f45-9708-019B960494DF}">
-                  <a14:hiddenLine xmlns:a14="http://schemas.microsoft.com/office/drawing/2010/main" xmlns="" w="9525">
+                  <a14:hiddenLine xmlns="" xmlns:a14="http://schemas.microsoft.com/office/drawing/2010/main" w="9525">
                     <a:solidFill>
                       <a:srgbClr val="000000"/>
                     </a:solidFill>
@@ -10499,7 +10661,7 @@
               </a:ln>
               <a:extLst>
                 <a:ext uri="{91240B29-F687-4f45-9708-019B960494DF}">
-                  <a14:hiddenLine xmlns:a14="http://schemas.microsoft.com/office/drawing/2010/main" xmlns="" w="9525">
+                  <a14:hiddenLine xmlns="" xmlns:a14="http://schemas.microsoft.com/office/drawing/2010/main" w="9525">
                     <a:solidFill>
                       <a:srgbClr val="000000"/>
                     </a:solidFill>
@@ -10583,7 +10745,7 @@
               </a:ln>
               <a:extLst>
                 <a:ext uri="{91240B29-F687-4f45-9708-019B960494DF}">
-                  <a14:hiddenLine xmlns:a14="http://schemas.microsoft.com/office/drawing/2010/main" xmlns="" w="9525">
+                  <a14:hiddenLine xmlns="" xmlns:a14="http://schemas.microsoft.com/office/drawing/2010/main" w="9525">
                     <a:solidFill>
                       <a:srgbClr val="000000"/>
                     </a:solidFill>
@@ -10645,7 +10807,7 @@
               </a:ln>
               <a:extLst>
                 <a:ext uri="{91240B29-F687-4f45-9708-019B960494DF}">
-                  <a14:hiddenLine xmlns:a14="http://schemas.microsoft.com/office/drawing/2010/main" xmlns="" w="9525">
+                  <a14:hiddenLine xmlns="" xmlns:a14="http://schemas.microsoft.com/office/drawing/2010/main" w="9525">
                     <a:solidFill>
                       <a:srgbClr val="000000"/>
                     </a:solidFill>
@@ -10707,7 +10869,7 @@
               </a:ln>
               <a:extLst>
                 <a:ext uri="{91240B29-F687-4f45-9708-019B960494DF}">
-                  <a14:hiddenLine xmlns:a14="http://schemas.microsoft.com/office/drawing/2010/main" xmlns="" w="9525">
+                  <a14:hiddenLine xmlns="" xmlns:a14="http://schemas.microsoft.com/office/drawing/2010/main" w="9525">
                     <a:solidFill>
                       <a:srgbClr val="000000"/>
                     </a:solidFill>
@@ -10797,7 +10959,7 @@
               </a:ln>
               <a:extLst>
                 <a:ext uri="{91240B29-F687-4f45-9708-019B960494DF}">
-                  <a14:hiddenLine xmlns:a14="http://schemas.microsoft.com/office/drawing/2010/main" xmlns="" w="9525">
+                  <a14:hiddenLine xmlns="" xmlns:a14="http://schemas.microsoft.com/office/drawing/2010/main" w="9525">
                     <a:solidFill>
                       <a:srgbClr val="000000"/>
                     </a:solidFill>
@@ -10831,7 +10993,7 @@
               </a:ln>
               <a:extLst>
                 <a:ext uri="{91240B29-F687-4f45-9708-019B960494DF}">
-                  <a14:hiddenLine xmlns:a14="http://schemas.microsoft.com/office/drawing/2010/main" xmlns="" w="9525">
+                  <a14:hiddenLine xmlns="" xmlns:a14="http://schemas.microsoft.com/office/drawing/2010/main" w="9525">
                     <a:solidFill>
                       <a:srgbClr val="000000"/>
                     </a:solidFill>
@@ -10896,7 +11058,7 @@
               </a:ln>
               <a:extLst>
                 <a:ext uri="{91240B29-F687-4f45-9708-019B960494DF}">
-                  <a14:hiddenLine xmlns:a14="http://schemas.microsoft.com/office/drawing/2010/main" xmlns="" w="9525">
+                  <a14:hiddenLine xmlns="" xmlns:a14="http://schemas.microsoft.com/office/drawing/2010/main" w="9525">
                     <a:solidFill>
                       <a:srgbClr val="000000"/>
                     </a:solidFill>
@@ -10986,7 +11148,7 @@
               </a:ln>
               <a:extLst>
                 <a:ext uri="{91240B29-F687-4f45-9708-019B960494DF}">
-                  <a14:hiddenLine xmlns:a14="http://schemas.microsoft.com/office/drawing/2010/main" xmlns="" w="9525">
+                  <a14:hiddenLine xmlns="" xmlns:a14="http://schemas.microsoft.com/office/drawing/2010/main" w="9525">
                     <a:solidFill>
                       <a:srgbClr val="000000"/>
                     </a:solidFill>
@@ -11048,7 +11210,7 @@
               </a:ln>
               <a:extLst>
                 <a:ext uri="{91240B29-F687-4f45-9708-019B960494DF}">
-                  <a14:hiddenLine xmlns:a14="http://schemas.microsoft.com/office/drawing/2010/main" xmlns="" w="9525">
+                  <a14:hiddenLine xmlns="" xmlns:a14="http://schemas.microsoft.com/office/drawing/2010/main" w="9525">
                     <a:solidFill>
                       <a:srgbClr val="000000"/>
                     </a:solidFill>
@@ -11138,7 +11300,7 @@
               </a:ln>
               <a:extLst>
                 <a:ext uri="{91240B29-F687-4f45-9708-019B960494DF}">
-                  <a14:hiddenLine xmlns:a14="http://schemas.microsoft.com/office/drawing/2010/main" xmlns="" w="9525">
+                  <a14:hiddenLine xmlns="" xmlns:a14="http://schemas.microsoft.com/office/drawing/2010/main" w="9525">
                     <a:solidFill>
                       <a:srgbClr val="000000"/>
                     </a:solidFill>
@@ -11203,7 +11365,7 @@
               </a:ln>
               <a:extLst>
                 <a:ext uri="{91240B29-F687-4f45-9708-019B960494DF}">
-                  <a14:hiddenLine xmlns:a14="http://schemas.microsoft.com/office/drawing/2010/main" xmlns="" w="9525">
+                  <a14:hiddenLine xmlns="" xmlns:a14="http://schemas.microsoft.com/office/drawing/2010/main" w="9525">
                     <a:solidFill>
                       <a:srgbClr val="000000"/>
                     </a:solidFill>
@@ -11265,7 +11427,7 @@
               </a:ln>
               <a:extLst>
                 <a:ext uri="{91240B29-F687-4f45-9708-019B960494DF}">
-                  <a14:hiddenLine xmlns:a14="http://schemas.microsoft.com/office/drawing/2010/main" xmlns="" w="9525">
+                  <a14:hiddenLine xmlns="" xmlns:a14="http://schemas.microsoft.com/office/drawing/2010/main" w="9525">
                     <a:solidFill>
                       <a:srgbClr val="000000"/>
                     </a:solidFill>
@@ -11355,7 +11517,7 @@
               </a:ln>
               <a:extLst>
                 <a:ext uri="{91240B29-F687-4f45-9708-019B960494DF}">
-                  <a14:hiddenLine xmlns:a14="http://schemas.microsoft.com/office/drawing/2010/main" xmlns="" w="9525">
+                  <a14:hiddenLine xmlns="" xmlns:a14="http://schemas.microsoft.com/office/drawing/2010/main" w="9525">
                     <a:solidFill>
                       <a:srgbClr val="000000"/>
                     </a:solidFill>
@@ -11445,7 +11607,7 @@
               </a:ln>
               <a:extLst>
                 <a:ext uri="{91240B29-F687-4f45-9708-019B960494DF}">
-                  <a14:hiddenLine xmlns:a14="http://schemas.microsoft.com/office/drawing/2010/main" xmlns="" w="9525">
+                  <a14:hiddenLine xmlns="" xmlns:a14="http://schemas.microsoft.com/office/drawing/2010/main" w="9525">
                     <a:solidFill>
                       <a:srgbClr val="000000"/>
                     </a:solidFill>
@@ -11510,7 +11672,7 @@
               </a:ln>
               <a:extLst>
                 <a:ext uri="{91240B29-F687-4f45-9708-019B960494DF}">
-                  <a14:hiddenLine xmlns:a14="http://schemas.microsoft.com/office/drawing/2010/main" xmlns="" w="9525">
+                  <a14:hiddenLine xmlns="" xmlns:a14="http://schemas.microsoft.com/office/drawing/2010/main" w="9525">
                     <a:solidFill>
                       <a:srgbClr val="000000"/>
                     </a:solidFill>
@@ -11630,7 +11792,7 @@
               </a:ln>
               <a:extLst>
                 <a:ext uri="{91240B29-F687-4f45-9708-019B960494DF}">
-                  <a14:hiddenLine xmlns:a14="http://schemas.microsoft.com/office/drawing/2010/main" xmlns="" w="9525">
+                  <a14:hiddenLine xmlns="" xmlns:a14="http://schemas.microsoft.com/office/drawing/2010/main" w="9525">
                     <a:solidFill>
                       <a:srgbClr val="000000"/>
                     </a:solidFill>
@@ -11711,7 +11873,7 @@
               </a:ln>
               <a:extLst>
                 <a:ext uri="{91240B29-F687-4f45-9708-019B960494DF}">
-                  <a14:hiddenLine xmlns:a14="http://schemas.microsoft.com/office/drawing/2010/main" xmlns="" w="9525">
+                  <a14:hiddenLine xmlns="" xmlns:a14="http://schemas.microsoft.com/office/drawing/2010/main" w="9525">
                     <a:solidFill>
                       <a:srgbClr val="000000"/>
                     </a:solidFill>
@@ -11826,7 +11988,7 @@
               </a:ln>
               <a:extLst>
                 <a:ext uri="{91240B29-F687-4f45-9708-019B960494DF}">
-                  <a14:hiddenLine xmlns:a14="http://schemas.microsoft.com/office/drawing/2010/main" xmlns="" w="9525">
+                  <a14:hiddenLine xmlns="" xmlns:a14="http://schemas.microsoft.com/office/drawing/2010/main" w="9525">
                     <a:solidFill>
                       <a:srgbClr val="000000"/>
                     </a:solidFill>
@@ -11916,7 +12078,7 @@
               </a:ln>
               <a:extLst>
                 <a:ext uri="{91240B29-F687-4f45-9708-019B960494DF}">
-                  <a14:hiddenLine xmlns:a14="http://schemas.microsoft.com/office/drawing/2010/main" xmlns="" w="9525">
+                  <a14:hiddenLine xmlns="" xmlns:a14="http://schemas.microsoft.com/office/drawing/2010/main" w="9525">
                     <a:solidFill>
                       <a:srgbClr val="000000"/>
                     </a:solidFill>
@@ -11981,7 +12143,7 @@
               </a:ln>
               <a:extLst>
                 <a:ext uri="{91240B29-F687-4f45-9708-019B960494DF}">
-                  <a14:hiddenLine xmlns:a14="http://schemas.microsoft.com/office/drawing/2010/main" xmlns="" w="9525">
+                  <a14:hiddenLine xmlns="" xmlns:a14="http://schemas.microsoft.com/office/drawing/2010/main" w="9525">
                     <a:solidFill>
                       <a:srgbClr val="000000"/>
                     </a:solidFill>
@@ -12071,7 +12233,7 @@
               </a:ln>
               <a:extLst>
                 <a:ext uri="{91240B29-F687-4f45-9708-019B960494DF}">
-                  <a14:hiddenLine xmlns:a14="http://schemas.microsoft.com/office/drawing/2010/main" xmlns="" w="9525">
+                  <a14:hiddenLine xmlns="" xmlns:a14="http://schemas.microsoft.com/office/drawing/2010/main" w="9525">
                     <a:solidFill>
                       <a:srgbClr val="000000"/>
                     </a:solidFill>
@@ -12139,7 +12301,7 @@
               </a:ln>
               <a:extLst>
                 <a:ext uri="{91240B29-F687-4f45-9708-019B960494DF}">
-                  <a14:hiddenLine xmlns:a14="http://schemas.microsoft.com/office/drawing/2010/main" xmlns="" w="9525">
+                  <a14:hiddenLine xmlns="" xmlns:a14="http://schemas.microsoft.com/office/drawing/2010/main" w="9525">
                     <a:solidFill>
                       <a:srgbClr val="000000"/>
                     </a:solidFill>
@@ -12229,7 +12391,7 @@
               </a:ln>
               <a:extLst>
                 <a:ext uri="{91240B29-F687-4f45-9708-019B960494DF}">
-                  <a14:hiddenLine xmlns:a14="http://schemas.microsoft.com/office/drawing/2010/main" xmlns="" w="9525">
+                  <a14:hiddenLine xmlns="" xmlns:a14="http://schemas.microsoft.com/office/drawing/2010/main" w="9525">
                     <a:solidFill>
                       <a:srgbClr val="000000"/>
                     </a:solidFill>
@@ -12297,7 +12459,7 @@
               </a:ln>
               <a:extLst>
                 <a:ext uri="{91240B29-F687-4f45-9708-019B960494DF}">
-                  <a14:hiddenLine xmlns:a14="http://schemas.microsoft.com/office/drawing/2010/main" xmlns="" w="9525">
+                  <a14:hiddenLine xmlns="" xmlns:a14="http://schemas.microsoft.com/office/drawing/2010/main" w="9525">
                     <a:solidFill>
                       <a:srgbClr val="000000"/>
                     </a:solidFill>
@@ -12387,7 +12549,7 @@
               </a:ln>
               <a:extLst>
                 <a:ext uri="{91240B29-F687-4f45-9708-019B960494DF}">
-                  <a14:hiddenLine xmlns:a14="http://schemas.microsoft.com/office/drawing/2010/main" xmlns="" w="9525">
+                  <a14:hiddenLine xmlns="" xmlns:a14="http://schemas.microsoft.com/office/drawing/2010/main" w="9525">
                     <a:solidFill>
                       <a:srgbClr val="000000"/>
                     </a:solidFill>
@@ -12421,7 +12583,7 @@
               </a:ln>
               <a:extLst>
                 <a:ext uri="{91240B29-F687-4f45-9708-019B960494DF}">
-                  <a14:hiddenLine xmlns:a14="http://schemas.microsoft.com/office/drawing/2010/main" xmlns="" w="9525">
+                  <a14:hiddenLine xmlns="" xmlns:a14="http://schemas.microsoft.com/office/drawing/2010/main" w="9525">
                     <a:solidFill>
                       <a:srgbClr val="000000"/>
                     </a:solidFill>
@@ -12561,7 +12723,7 @@
           <a:p>
             <a:fld id="{D29DBA72-526C-40C7-B231-DFAA8CD27BC6}" type="datetimeFigureOut">
               <a:rPr lang="de-DE" smtClean="0"/>
-              <a:t>02.03.2020</a:t>
+              <a:t>25.03.2020</a:t>
             </a:fld>
             <a:endParaRPr lang="de-DE"/>
           </a:p>
@@ -13223,7 +13385,7 @@
                 <a:latin typeface="Arial" panose="020B0604020202020204" pitchFamily="34" charset="0"/>
                 <a:cs typeface="Arial" panose="020B0604020202020204" pitchFamily="34" charset="0"/>
               </a:rPr>
-              <a:t>Von Schrottwieser, Brugger, Danzer									24.14.2020</a:t>
+              <a:t>Von Schrottwieser, Brugger, Danzer									24.03.2020</a:t>
             </a:r>
           </a:p>
         </p:txBody>
@@ -13273,13 +13435,13 @@
   <p:clrMapOvr>
     <a:masterClrMapping/>
   </p:clrMapOvr>
-  <mc:AlternateContent xmlns:mc="http://schemas.openxmlformats.org/markup-compatibility/2006">
-    <mc:Choice xmlns:p14="http://schemas.microsoft.com/office/powerpoint/2010/main" Requires="p14">
+  <mc:AlternateContent xmlns:mc="http://schemas.openxmlformats.org/markup-compatibility/2006" xmlns:p14="http://schemas.microsoft.com/office/powerpoint/2010/main">
+    <mc:Choice Requires="p14">
       <p:transition spd="slow" p14:dur="1400">
         <p14:doors dir="vert"/>
       </p:transition>
     </mc:Choice>
-    <mc:Fallback>
+    <mc:Fallback xmlns="">
       <p:transition spd="slow">
         <p:fade/>
       </p:transition>
@@ -13364,7 +13526,7 @@
         </p:spPr>
         <p:txBody>
           <a:bodyPr>
-            <a:normAutofit fontScale="40000" lnSpcReduction="20000"/>
+            <a:normAutofit fontScale="55000" lnSpcReduction="20000"/>
           </a:bodyPr>
           <a:lstStyle/>
           <a:p>
@@ -13383,7 +13545,7 @@
                 <a:latin typeface="Arial" panose="020B0604020202020204" pitchFamily="34" charset="0"/>
                 <a:cs typeface="Arial" panose="020B0604020202020204" pitchFamily="34" charset="0"/>
               </a:rPr>
-              <a:t> Stunden</a:t>
+              <a:t> 21 Stunden</a:t>
             </a:r>
           </a:p>
           <a:p>
@@ -13393,7 +13555,7 @@
                 <a:latin typeface="Arial" panose="020B0604020202020204" pitchFamily="34" charset="0"/>
                 <a:cs typeface="Arial" panose="020B0604020202020204" pitchFamily="34" charset="0"/>
               </a:rPr>
-              <a:t> der Arbeit fertig</a:t>
+              <a:t> 14% der Arbeit fertig</a:t>
             </a:r>
           </a:p>
           <a:p>
@@ -13412,7 +13574,7 @@
                 <a:latin typeface="Arial" panose="020B0604020202020204" pitchFamily="34" charset="0"/>
                 <a:cs typeface="Arial" panose="020B0604020202020204" pitchFamily="34" charset="0"/>
               </a:rPr>
-              <a:t> Stunden</a:t>
+              <a:t> 15 Stunden</a:t>
             </a:r>
           </a:p>
           <a:p>
@@ -13422,7 +13584,7 @@
                 <a:latin typeface="Arial" panose="020B0604020202020204" pitchFamily="34" charset="0"/>
                 <a:cs typeface="Arial" panose="020B0604020202020204" pitchFamily="34" charset="0"/>
               </a:rPr>
-              <a:t> der Arbeit fertig </a:t>
+              <a:t> 10% der Arbeit fertig </a:t>
             </a:r>
           </a:p>
           <a:p>
@@ -13441,7 +13603,7 @@
                 <a:latin typeface="Arial" panose="020B0604020202020204" pitchFamily="34" charset="0"/>
                 <a:cs typeface="Arial" panose="020B0604020202020204" pitchFamily="34" charset="0"/>
               </a:rPr>
-              <a:t> Stunden</a:t>
+              <a:t> 22 Stunden</a:t>
             </a:r>
           </a:p>
           <a:p>
@@ -13451,36 +13613,7 @@
                 <a:latin typeface="Arial" panose="020B0604020202020204" pitchFamily="34" charset="0"/>
                 <a:cs typeface="Arial" panose="020B0604020202020204" pitchFamily="34" charset="0"/>
               </a:rPr>
-              <a:t> der Arbeit fertig</a:t>
-            </a:r>
-          </a:p>
-          <a:p>
-            <a:r>
-              <a:rPr lang="de-DE" sz="4400" dirty="0">
-                <a:latin typeface="Arial" panose="020B0604020202020204" pitchFamily="34" charset="0"/>
-                <a:cs typeface="Arial" panose="020B0604020202020204" pitchFamily="34" charset="0"/>
-              </a:rPr>
-              <a:t>Tobias Weiss</a:t>
-            </a:r>
-          </a:p>
-          <a:p>
-            <a:pPr lvl="1"/>
-            <a:r>
-              <a:rPr lang="de-DE" sz="4400" dirty="0">
-                <a:latin typeface="Arial" panose="020B0604020202020204" pitchFamily="34" charset="0"/>
-                <a:cs typeface="Arial" panose="020B0604020202020204" pitchFamily="34" charset="0"/>
-              </a:rPr>
-              <a:t> Stunden</a:t>
-            </a:r>
-          </a:p>
-          <a:p>
-            <a:pPr lvl="1"/>
-            <a:r>
-              <a:rPr lang="de-DE" sz="4400" dirty="0">
-                <a:latin typeface="Arial" panose="020B0604020202020204" pitchFamily="34" charset="0"/>
-                <a:cs typeface="Arial" panose="020B0604020202020204" pitchFamily="34" charset="0"/>
-              </a:rPr>
-              <a:t> der Arbeit fertig</a:t>
+              <a:t> 15% der Arbeit fertig</a:t>
             </a:r>
           </a:p>
           <a:p>
@@ -13534,13 +13667,13 @@
   <p:clrMapOvr>
     <a:masterClrMapping/>
   </p:clrMapOvr>
-  <mc:AlternateContent xmlns:mc="http://schemas.openxmlformats.org/markup-compatibility/2006">
-    <mc:Choice xmlns:p159="http://schemas.microsoft.com/office/powerpoint/2015/09/main" Requires="p159">
+  <mc:AlternateContent xmlns:mc="http://schemas.openxmlformats.org/markup-compatibility/2006" xmlns:p159="http://schemas.microsoft.com/office/powerpoint/2015/09/main">
+    <mc:Choice Requires="p159">
       <p:transition xmlns:p14="http://schemas.microsoft.com/office/powerpoint/2010/main" spd="slow" p14:dur="2000">
         <p159:morph option="byObject"/>
       </p:transition>
     </mc:Choice>
-    <mc:Fallback>
+    <mc:Fallback xmlns="">
       <p:transition spd="slow">
         <p:fade/>
       </p:transition>
@@ -13614,13 +13747,13 @@
   <p:clrMapOvr>
     <a:masterClrMapping/>
   </p:clrMapOvr>
-  <mc:AlternateContent xmlns:mc="http://schemas.openxmlformats.org/markup-compatibility/2006">
-    <mc:Choice xmlns:p159="http://schemas.microsoft.com/office/powerpoint/2015/09/main" Requires="p159">
+  <mc:AlternateContent xmlns:mc="http://schemas.openxmlformats.org/markup-compatibility/2006" xmlns:p159="http://schemas.microsoft.com/office/powerpoint/2015/09/main">
+    <mc:Choice Requires="p159">
       <p:transition xmlns:p14="http://schemas.microsoft.com/office/powerpoint/2010/main" spd="slow" p14:dur="2000">
         <p159:morph option="byObject"/>
       </p:transition>
     </mc:Choice>
-    <mc:Fallback>
+    <mc:Fallback xmlns="">
       <p:transition spd="slow">
         <p:fade/>
       </p:transition>
@@ -13819,13 +13952,13 @@
   <p:clrMapOvr>
     <a:masterClrMapping/>
   </p:clrMapOvr>
-  <mc:AlternateContent xmlns:mc="http://schemas.openxmlformats.org/markup-compatibility/2006">
-    <mc:Choice xmlns:p159="http://schemas.microsoft.com/office/powerpoint/2015/09/main" Requires="p159">
+  <mc:AlternateContent xmlns:mc="http://schemas.openxmlformats.org/markup-compatibility/2006" xmlns:p159="http://schemas.microsoft.com/office/powerpoint/2015/09/main">
+    <mc:Choice Requires="p159">
       <p:transition xmlns:p14="http://schemas.microsoft.com/office/powerpoint/2010/main" spd="slow" p14:dur="2000">
         <p159:morph option="byObject"/>
       </p:transition>
     </mc:Choice>
-    <mc:Fallback>
+    <mc:Fallback xmlns="">
       <p:transition spd="slow">
         <p:fade/>
       </p:transition>
@@ -13924,11 +14057,18 @@
           </a:p>
           <a:p>
             <a:r>
+              <a:rPr lang="de-DE" dirty="0" err="1">
+                <a:latin typeface="Arial" panose="020B0604020202020204" pitchFamily="34" charset="0"/>
+                <a:cs typeface="Arial" panose="020B0604020202020204" pitchFamily="34" charset="0"/>
+              </a:rPr>
+              <a:t>Frontend&amp;Backend-Developer</a:t>
+            </a:r>
+            <a:r>
               <a:rPr lang="de-DE" dirty="0">
                 <a:latin typeface="Arial" panose="020B0604020202020204" pitchFamily="34" charset="0"/>
                 <a:cs typeface="Arial" panose="020B0604020202020204" pitchFamily="34" charset="0"/>
               </a:rPr>
-              <a:t>Backend-Developer: Kalian Danzer</a:t>
+              <a:t>: Kalian Danzer</a:t>
             </a:r>
           </a:p>
           <a:p>
@@ -13946,7 +14086,7 @@
                 <a:latin typeface="Arial" panose="020B0604020202020204" pitchFamily="34" charset="0"/>
                 <a:cs typeface="Arial" panose="020B0604020202020204" pitchFamily="34" charset="0"/>
               </a:rPr>
-              <a:t>Projektbetreuer: Markus Schabe</a:t>
+              <a:t>Projektbetreuer: Markus Schabel</a:t>
             </a:r>
           </a:p>
           <a:p>
@@ -14006,13 +14146,13 @@
   <p:clrMapOvr>
     <a:masterClrMapping/>
   </p:clrMapOvr>
-  <mc:AlternateContent xmlns:mc="http://schemas.openxmlformats.org/markup-compatibility/2006">
-    <mc:Choice xmlns:p159="http://schemas.microsoft.com/office/powerpoint/2015/09/main" Requires="p159">
+  <mc:AlternateContent xmlns:mc="http://schemas.openxmlformats.org/markup-compatibility/2006" xmlns:p159="http://schemas.microsoft.com/office/powerpoint/2015/09/main">
+    <mc:Choice Requires="p159">
       <p:transition xmlns:p14="http://schemas.microsoft.com/office/powerpoint/2010/main" spd="slow" p14:dur="2000">
         <p159:morph option="byObject"/>
       </p:transition>
     </mc:Choice>
-    <mc:Fallback>
+    <mc:Fallback xmlns="">
       <p:transition spd="slow">
         <p:fade/>
       </p:transition>
@@ -14097,10 +14237,42 @@
           </a:bodyPr>
           <a:lstStyle/>
           <a:p>
-            <a:endParaRPr lang="de-DE" dirty="0">
-              <a:latin typeface="Arial" panose="020B0604020202020204" pitchFamily="34" charset="0"/>
-              <a:cs typeface="Arial" panose="020B0604020202020204" pitchFamily="34" charset="0"/>
-            </a:endParaRPr>
+            <a:r>
+              <a:rPr lang="de-DE" dirty="0">
+                <a:latin typeface="Arial" panose="020B0604020202020204" pitchFamily="34" charset="0"/>
+                <a:cs typeface="Arial" panose="020B0604020202020204" pitchFamily="34" charset="0"/>
+              </a:rPr>
+              <a:t>Simulierte Umgebung</a:t>
+            </a:r>
+          </a:p>
+          <a:p>
+            <a:pPr lvl="1"/>
+            <a:r>
+              <a:rPr lang="de-DE" dirty="0">
+                <a:latin typeface="Arial" panose="020B0604020202020204" pitchFamily="34" charset="0"/>
+                <a:cs typeface="Arial" panose="020B0604020202020204" pitchFamily="34" charset="0"/>
+              </a:rPr>
+              <a:t>„Spielumgebung und die Roboter sollen simuliert werden für Handy oder PC“</a:t>
+            </a:r>
+          </a:p>
+          <a:p>
+            <a:r>
+              <a:rPr lang="de-DE" dirty="0">
+                <a:latin typeface="Arial" panose="020B0604020202020204" pitchFamily="34" charset="0"/>
+                <a:cs typeface="Arial" panose="020B0604020202020204" pitchFamily="34" charset="0"/>
+              </a:rPr>
+              <a:t>Realisierung in Hardware</a:t>
+            </a:r>
+          </a:p>
+          <a:p>
+            <a:pPr lvl="1"/>
+            <a:r>
+              <a:rPr lang="de-DE" dirty="0">
+                <a:latin typeface="Arial" panose="020B0604020202020204" pitchFamily="34" charset="0"/>
+                <a:cs typeface="Arial" panose="020B0604020202020204" pitchFamily="34" charset="0"/>
+              </a:rPr>
+              <a:t>„Spielumgebung und die Roboter existieren real, entsprechende Spielbretter und Roboter müssen gefertigt werden“</a:t>
+            </a:r>
           </a:p>
         </p:txBody>
       </p:sp>
@@ -14150,13 +14322,13 @@
   <p:clrMapOvr>
     <a:masterClrMapping/>
   </p:clrMapOvr>
-  <mc:AlternateContent xmlns:mc="http://schemas.openxmlformats.org/markup-compatibility/2006">
-    <mc:Choice xmlns:p159="http://schemas.microsoft.com/office/powerpoint/2015/09/main" Requires="p159">
+  <mc:AlternateContent xmlns:mc="http://schemas.openxmlformats.org/markup-compatibility/2006" xmlns:p159="http://schemas.microsoft.com/office/powerpoint/2015/09/main">
+    <mc:Choice Requires="p159">
       <p:transition xmlns:p14="http://schemas.microsoft.com/office/powerpoint/2010/main" spd="slow" p14:dur="2000">
         <p159:morph option="byObject"/>
       </p:transition>
     </mc:Choice>
-    <mc:Fallback>
+    <mc:Fallback xmlns="">
       <p:transition spd="slow">
         <p:fade/>
       </p:transition>
@@ -14307,6 +14479,264 @@
           </a:prstGeom>
         </p:spPr>
       </p:pic>
+      <p:sp>
+        <p:nvSpPr>
+          <p:cNvPr id="5" name="Inhaltsplatzhalter 2">
+            <a:extLst>
+              <a:ext uri="{FF2B5EF4-FFF2-40B4-BE49-F238E27FC236}">
+                <a16:creationId xmlns:a16="http://schemas.microsoft.com/office/drawing/2014/main" id="{F2176D1F-AD08-4B7E-AB4D-CF289BF8DB65}"/>
+              </a:ext>
+            </a:extLst>
+          </p:cNvPr>
+          <p:cNvSpPr txBox="1">
+            <a:spLocks/>
+          </p:cNvSpPr>
+          <p:nvPr/>
+        </p:nvSpPr>
+        <p:spPr>
+          <a:xfrm>
+            <a:off x="1451579" y="1853754"/>
+            <a:ext cx="9291215" cy="4199727"/>
+          </a:xfrm>
+          <a:prstGeom prst="rect">
+            <a:avLst/>
+          </a:prstGeom>
+        </p:spPr>
+        <p:txBody>
+          <a:bodyPr vert="horz" lIns="91440" tIns="45720" rIns="91440" bIns="45720" rtlCol="0">
+            <a:normAutofit/>
+          </a:bodyPr>
+          <a:lstStyle>
+            <a:lvl1pPr marL="228600" indent="-228600" algn="l" defTabSz="914400" rtl="0" eaLnBrk="1" latinLnBrk="0" hangingPunct="1">
+              <a:lnSpc>
+                <a:spcPct val="120000"/>
+              </a:lnSpc>
+              <a:spcBef>
+                <a:spcPts val="1000"/>
+              </a:spcBef>
+              <a:buSzPct val="125000"/>
+              <a:buFont typeface="Arial" panose="020B0604020202020204" pitchFamily="34" charset="0"/>
+              <a:buChar char="•"/>
+              <a:defRPr sz="2400" kern="1200">
+                <a:solidFill>
+                  <a:schemeClr val="tx1"/>
+                </a:solidFill>
+                <a:latin typeface="+mn-lt"/>
+                <a:ea typeface="+mn-ea"/>
+                <a:cs typeface="+mn-cs"/>
+              </a:defRPr>
+            </a:lvl1pPr>
+            <a:lvl2pPr marL="685800" indent="-228600" algn="l" defTabSz="914400" rtl="0" eaLnBrk="1" latinLnBrk="0" hangingPunct="1">
+              <a:lnSpc>
+                <a:spcPct val="120000"/>
+              </a:lnSpc>
+              <a:spcBef>
+                <a:spcPts val="500"/>
+              </a:spcBef>
+              <a:buSzPct val="125000"/>
+              <a:buFont typeface="Arial" panose="020B0604020202020204" pitchFamily="34" charset="0"/>
+              <a:buChar char="•"/>
+              <a:defRPr sz="2000" kern="1200">
+                <a:solidFill>
+                  <a:schemeClr val="tx1"/>
+                </a:solidFill>
+                <a:latin typeface="+mn-lt"/>
+                <a:ea typeface="+mn-ea"/>
+                <a:cs typeface="+mn-cs"/>
+              </a:defRPr>
+            </a:lvl2pPr>
+            <a:lvl3pPr marL="1143000" indent="-228600" algn="l" defTabSz="914400" rtl="0" eaLnBrk="1" latinLnBrk="0" hangingPunct="1">
+              <a:lnSpc>
+                <a:spcPct val="120000"/>
+              </a:lnSpc>
+              <a:spcBef>
+                <a:spcPts val="500"/>
+              </a:spcBef>
+              <a:buSzPct val="125000"/>
+              <a:buFont typeface="Arial" panose="020B0604020202020204" pitchFamily="34" charset="0"/>
+              <a:buChar char="•"/>
+              <a:defRPr sz="1800" kern="1200">
+                <a:solidFill>
+                  <a:schemeClr val="tx1"/>
+                </a:solidFill>
+                <a:latin typeface="+mn-lt"/>
+                <a:ea typeface="+mn-ea"/>
+                <a:cs typeface="+mn-cs"/>
+              </a:defRPr>
+            </a:lvl3pPr>
+            <a:lvl4pPr marL="1600200" indent="-228600" algn="l" defTabSz="914400" rtl="0" eaLnBrk="1" latinLnBrk="0" hangingPunct="1">
+              <a:lnSpc>
+                <a:spcPct val="120000"/>
+              </a:lnSpc>
+              <a:spcBef>
+                <a:spcPts val="500"/>
+              </a:spcBef>
+              <a:buSzPct val="125000"/>
+              <a:buFont typeface="Arial" panose="020B0604020202020204" pitchFamily="34" charset="0"/>
+              <a:buChar char="•"/>
+              <a:defRPr sz="1600" kern="1200">
+                <a:solidFill>
+                  <a:schemeClr val="tx1"/>
+                </a:solidFill>
+                <a:latin typeface="+mn-lt"/>
+                <a:ea typeface="+mn-ea"/>
+                <a:cs typeface="+mn-cs"/>
+              </a:defRPr>
+            </a:lvl4pPr>
+            <a:lvl5pPr marL="2057400" indent="-228600" algn="l" defTabSz="914400" rtl="0" eaLnBrk="1" latinLnBrk="0" hangingPunct="1">
+              <a:lnSpc>
+                <a:spcPct val="120000"/>
+              </a:lnSpc>
+              <a:spcBef>
+                <a:spcPts val="500"/>
+              </a:spcBef>
+              <a:buSzPct val="125000"/>
+              <a:buFont typeface="Arial" panose="020B0604020202020204" pitchFamily="34" charset="0"/>
+              <a:buChar char="•"/>
+              <a:defRPr sz="1600" kern="1200">
+                <a:solidFill>
+                  <a:schemeClr val="tx1"/>
+                </a:solidFill>
+                <a:latin typeface="+mn-lt"/>
+                <a:ea typeface="+mn-ea"/>
+                <a:cs typeface="+mn-cs"/>
+              </a:defRPr>
+            </a:lvl5pPr>
+            <a:lvl6pPr marL="2514600" indent="-228600" algn="l" defTabSz="914400" rtl="0" eaLnBrk="1" latinLnBrk="0" hangingPunct="1">
+              <a:lnSpc>
+                <a:spcPct val="120000"/>
+              </a:lnSpc>
+              <a:spcBef>
+                <a:spcPts val="500"/>
+              </a:spcBef>
+              <a:buSzPct val="125000"/>
+              <a:buFont typeface="Arial" panose="020B0604020202020204" pitchFamily="34" charset="0"/>
+              <a:buChar char="•"/>
+              <a:defRPr sz="1400" kern="1200">
+                <a:solidFill>
+                  <a:schemeClr val="tx1"/>
+                </a:solidFill>
+                <a:latin typeface="+mn-lt"/>
+                <a:ea typeface="+mn-ea"/>
+                <a:cs typeface="+mn-cs"/>
+              </a:defRPr>
+            </a:lvl6pPr>
+            <a:lvl7pPr marL="2971800" indent="-228600" algn="l" defTabSz="914400" rtl="0" eaLnBrk="1" latinLnBrk="0" hangingPunct="1">
+              <a:lnSpc>
+                <a:spcPct val="120000"/>
+              </a:lnSpc>
+              <a:spcBef>
+                <a:spcPts val="500"/>
+              </a:spcBef>
+              <a:buSzPct val="125000"/>
+              <a:buFont typeface="Arial" panose="020B0604020202020204" pitchFamily="34" charset="0"/>
+              <a:buChar char="•"/>
+              <a:defRPr sz="1400" kern="1200">
+                <a:solidFill>
+                  <a:schemeClr val="tx1"/>
+                </a:solidFill>
+                <a:latin typeface="+mn-lt"/>
+                <a:ea typeface="+mn-ea"/>
+                <a:cs typeface="+mn-cs"/>
+              </a:defRPr>
+            </a:lvl7pPr>
+            <a:lvl8pPr marL="3429000" indent="-228600" algn="l" defTabSz="914400" rtl="0" eaLnBrk="1" latinLnBrk="0" hangingPunct="1">
+              <a:lnSpc>
+                <a:spcPct val="120000"/>
+              </a:lnSpc>
+              <a:spcBef>
+                <a:spcPts val="500"/>
+              </a:spcBef>
+              <a:buSzPct val="125000"/>
+              <a:buFont typeface="Arial" panose="020B0604020202020204" pitchFamily="34" charset="0"/>
+              <a:buChar char="•"/>
+              <a:defRPr sz="1400" kern="1200">
+                <a:solidFill>
+                  <a:schemeClr val="tx1"/>
+                </a:solidFill>
+                <a:latin typeface="+mn-lt"/>
+                <a:ea typeface="+mn-ea"/>
+                <a:cs typeface="+mn-cs"/>
+              </a:defRPr>
+            </a:lvl8pPr>
+            <a:lvl9pPr marL="3886200" indent="-228600" algn="l" defTabSz="914400" rtl="0" eaLnBrk="1" latinLnBrk="0" hangingPunct="1">
+              <a:lnSpc>
+                <a:spcPct val="120000"/>
+              </a:lnSpc>
+              <a:spcBef>
+                <a:spcPts val="500"/>
+              </a:spcBef>
+              <a:buSzPct val="125000"/>
+              <a:buFont typeface="Arial" panose="020B0604020202020204" pitchFamily="34" charset="0"/>
+              <a:buChar char="•"/>
+              <a:defRPr sz="1400" kern="1200">
+                <a:solidFill>
+                  <a:schemeClr val="tx1"/>
+                </a:solidFill>
+                <a:latin typeface="+mn-lt"/>
+                <a:ea typeface="+mn-ea"/>
+                <a:cs typeface="+mn-cs"/>
+              </a:defRPr>
+            </a:lvl9pPr>
+          </a:lstStyle>
+          <a:p>
+            <a:r>
+              <a:rPr lang="de-DE" dirty="0">
+                <a:latin typeface="Arial" panose="020B0604020202020204" pitchFamily="34" charset="0"/>
+                <a:cs typeface="Arial" panose="020B0604020202020204" pitchFamily="34" charset="0"/>
+              </a:rPr>
+              <a:t>Unterhaltung</a:t>
+            </a:r>
+          </a:p>
+          <a:p>
+            <a:pPr lvl="1"/>
+            <a:r>
+              <a:rPr lang="de-DE" dirty="0">
+                <a:latin typeface="Arial" panose="020B0604020202020204" pitchFamily="34" charset="0"/>
+                <a:cs typeface="Arial" panose="020B0604020202020204" pitchFamily="34" charset="0"/>
+              </a:rPr>
+              <a:t>Spielerbasis unterhalten und die Bekanntheit des TGMs verbessern</a:t>
+            </a:r>
+          </a:p>
+          <a:p>
+            <a:r>
+              <a:rPr lang="de-DE" dirty="0">
+                <a:latin typeface="Arial" panose="020B0604020202020204" pitchFamily="34" charset="0"/>
+                <a:cs typeface="Arial" panose="020B0604020202020204" pitchFamily="34" charset="0"/>
+              </a:rPr>
+              <a:t>Profit</a:t>
+            </a:r>
+          </a:p>
+          <a:p>
+            <a:pPr lvl="1"/>
+            <a:r>
+              <a:rPr lang="de-DE">
+                <a:latin typeface="Arial" panose="020B0604020202020204" pitchFamily="34" charset="0"/>
+                <a:cs typeface="Arial" panose="020B0604020202020204" pitchFamily="34" charset="0"/>
+              </a:rPr>
+              <a:t>Erstes Jahr </a:t>
+            </a:r>
+            <a:r>
+              <a:rPr lang="de-DE" dirty="0">
+                <a:latin typeface="Arial" panose="020B0604020202020204" pitchFamily="34" charset="0"/>
+                <a:cs typeface="Arial" panose="020B0604020202020204" pitchFamily="34" charset="0"/>
+              </a:rPr>
+              <a:t>4000.00</a:t>
+            </a:r>
+            <a:r>
+              <a:rPr lang="de-DE">
+                <a:latin typeface="Arial" panose="020B0604020202020204" pitchFamily="34" charset="0"/>
+                <a:cs typeface="Arial" panose="020B0604020202020204" pitchFamily="34" charset="0"/>
+              </a:rPr>
+              <a:t>€ Gewinn</a:t>
+            </a:r>
+            <a:endParaRPr lang="de-DE" dirty="0">
+              <a:latin typeface="Arial" panose="020B0604020202020204" pitchFamily="34" charset="0"/>
+              <a:cs typeface="Arial" panose="020B0604020202020204" pitchFamily="34" charset="0"/>
+            </a:endParaRPr>
+          </a:p>
+        </p:txBody>
+      </p:sp>
     </p:spTree>
     <p:extLst>
       <p:ext uri="{BB962C8B-B14F-4D97-AF65-F5344CB8AC3E}">
@@ -14317,13 +14747,13 @@
   <p:clrMapOvr>
     <a:masterClrMapping/>
   </p:clrMapOvr>
-  <mc:AlternateContent xmlns:mc="http://schemas.openxmlformats.org/markup-compatibility/2006">
-    <mc:Choice xmlns:p159="http://schemas.microsoft.com/office/powerpoint/2015/09/main" Requires="p159">
+  <mc:AlternateContent xmlns:mc="http://schemas.openxmlformats.org/markup-compatibility/2006" xmlns:p159="http://schemas.microsoft.com/office/powerpoint/2015/09/main">
+    <mc:Choice Requires="p159">
       <p:transition xmlns:p14="http://schemas.microsoft.com/office/powerpoint/2010/main" spd="slow" p14:dur="2000">
         <p159:morph option="byObject"/>
       </p:transition>
     </mc:Choice>
-    <mc:Fallback>
+    <mc:Fallback xmlns="">
       <p:transition spd="slow">
         <p:fade/>
       </p:transition>
@@ -14395,14 +14825,14 @@
           <p:nvPr>
             <p:extLst>
               <p:ext uri="{D42A27DB-BD31-4B8C-83A1-F6EECF244321}">
-                <p14:modId xmlns:p14="http://schemas.microsoft.com/office/powerpoint/2010/main" val="753562432"/>
+                <p14:modId xmlns:p14="http://schemas.microsoft.com/office/powerpoint/2010/main" val="1416120538"/>
               </p:ext>
             </p:extLst>
           </p:nvPr>
         </p:nvGraphicFramePr>
         <p:xfrm>
           <a:off x="1141414" y="2232660"/>
-          <a:ext cx="9905997" cy="2528253"/>
+          <a:ext cx="9905997" cy="3718742"/>
         </p:xfrm>
         <a:graphic>
           <a:graphicData uri="http://schemas.openxmlformats.org/drawingml/2006/table">
@@ -14441,13 +14871,12 @@
                     <a:p>
                       <a:pPr algn="ctr"/>
                       <a:r>
-                        <a:rPr lang="de-DE" sz="2100" dirty="0"/>
+                        <a:rPr lang="de-DE" sz="2100" dirty="0">
+                          <a:latin typeface="Arial" panose="020B0604020202020204" pitchFamily="34" charset="0"/>
+                          <a:cs typeface="Arial" panose="020B0604020202020204" pitchFamily="34" charset="0"/>
+                        </a:rPr>
                         <a:t>Aufgabe</a:t>
                       </a:r>
-                      <a:endParaRPr lang="de-DE" sz="2100" dirty="0">
-                        <a:latin typeface="Arial" panose="020B0604020202020204" pitchFamily="34" charset="0"/>
-                        <a:cs typeface="Arial" panose="020B0604020202020204" pitchFamily="34" charset="0"/>
-                      </a:endParaRPr>
                     </a:p>
                   </a:txBody>
                   <a:tcPr marL="108872" marR="108872" marT="54436" marB="54436"/>
@@ -14459,13 +14888,12 @@
                     <a:p>
                       <a:pPr algn="ctr"/>
                       <a:r>
-                        <a:rPr lang="de-DE" sz="2100" dirty="0"/>
+                        <a:rPr lang="de-DE" sz="2100" dirty="0">
+                          <a:latin typeface="Arial" panose="020B0604020202020204" pitchFamily="34" charset="0"/>
+                          <a:cs typeface="Arial" panose="020B0604020202020204" pitchFamily="34" charset="0"/>
+                        </a:rPr>
                         <a:t>Soll-Termin</a:t>
                       </a:r>
-                      <a:endParaRPr lang="de-DE" sz="2100" dirty="0">
-                        <a:latin typeface="Arial" panose="020B0604020202020204" pitchFamily="34" charset="0"/>
-                        <a:cs typeface="Arial" panose="020B0604020202020204" pitchFamily="34" charset="0"/>
-                      </a:endParaRPr>
                     </a:p>
                   </a:txBody>
                   <a:tcPr marL="108872" marR="108872" marT="54436" marB="54436"/>
@@ -14477,13 +14905,12 @@
                     <a:p>
                       <a:pPr algn="ctr"/>
                       <a:r>
-                        <a:rPr lang="de-DE" sz="2100" dirty="0"/>
+                        <a:rPr lang="de-DE" sz="2100" dirty="0">
+                          <a:latin typeface="Arial" panose="020B0604020202020204" pitchFamily="34" charset="0"/>
+                          <a:cs typeface="Arial" panose="020B0604020202020204" pitchFamily="34" charset="0"/>
+                        </a:rPr>
                         <a:t>Ist-Termin</a:t>
                       </a:r>
-                      <a:endParaRPr lang="de-DE" sz="2100" dirty="0">
-                        <a:latin typeface="Arial" panose="020B0604020202020204" pitchFamily="34" charset="0"/>
-                        <a:cs typeface="Arial" panose="020B0604020202020204" pitchFamily="34" charset="0"/>
-                      </a:endParaRPr>
                     </a:p>
                   </a:txBody>
                   <a:tcPr marL="108872" marR="108872" marT="54436" marB="54436"/>
@@ -14518,13 +14945,12 @@
                         <a:defRPr/>
                       </a:pPr>
                       <a:r>
-                        <a:rPr lang="de-DE" sz="2100" dirty="0"/>
-                        <a:t>Datenbank erstellen</a:t>
+                        <a:rPr lang="de-DE" sz="2100" dirty="0">
+                          <a:latin typeface="Arial" panose="020B0604020202020204" pitchFamily="34" charset="0"/>
+                          <a:cs typeface="Arial" panose="020B0604020202020204" pitchFamily="34" charset="0"/>
+                        </a:rPr>
+                        <a:t>Dokumente vervollständigen</a:t>
                       </a:r>
-                      <a:endParaRPr lang="de-DE" sz="2100" dirty="0">
-                        <a:latin typeface="Arial" panose="020B0604020202020204" pitchFamily="34" charset="0"/>
-                        <a:cs typeface="Arial" panose="020B0604020202020204" pitchFamily="34" charset="0"/>
-                      </a:endParaRPr>
                     </a:p>
                   </a:txBody>
                   <a:tcPr marL="108872" marR="108872" marT="54436" marB="54436" anchor="ctr"/>
@@ -14534,11 +14960,14 @@
                     <a:bodyPr/>
                     <a:lstStyle/>
                     <a:p>
-                      <a:pPr algn="l"/>
-                      <a:endParaRPr lang="de-DE" sz="2100" dirty="0">
-                        <a:latin typeface="Arial" panose="020B0604020202020204" pitchFamily="34" charset="0"/>
-                        <a:cs typeface="Arial" panose="020B0604020202020204" pitchFamily="34" charset="0"/>
-                      </a:endParaRPr>
+                      <a:pPr algn="r"/>
+                      <a:r>
+                        <a:rPr lang="de-DE" sz="2100" dirty="0">
+                          <a:latin typeface="Arial" panose="020B0604020202020204" pitchFamily="34" charset="0"/>
+                          <a:cs typeface="Arial" panose="020B0604020202020204" pitchFamily="34" charset="0"/>
+                        </a:rPr>
+                        <a:t>26.03.2020</a:t>
+                      </a:r>
                     </a:p>
                   </a:txBody>
                   <a:tcPr marL="108872" marR="108872" marT="54436" marB="54436" anchor="ctr"/>
@@ -14548,11 +14977,88 @@
                     <a:bodyPr/>
                     <a:lstStyle/>
                     <a:p>
-                      <a:pPr algn="l"/>
-                      <a:endParaRPr lang="de-DE" sz="2100" dirty="0">
-                        <a:latin typeface="Arial" panose="020B0604020202020204" pitchFamily="34" charset="0"/>
-                        <a:cs typeface="Arial" panose="020B0604020202020204" pitchFamily="34" charset="0"/>
-                      </a:endParaRPr>
+                      <a:pPr algn="r"/>
+                      <a:r>
+                        <a:rPr lang="de-DE" sz="2100" dirty="0">
+                          <a:latin typeface="Arial" panose="020B0604020202020204" pitchFamily="34" charset="0"/>
+                          <a:cs typeface="Arial" panose="020B0604020202020204" pitchFamily="34" charset="0"/>
+                        </a:rPr>
+                        <a:t>25.03.2020</a:t>
+                      </a:r>
+                    </a:p>
+                  </a:txBody>
+                  <a:tcPr marL="108872" marR="108872" marT="54436" marB="54436" anchor="ctr"/>
+                </a:tc>
+                <a:extLst>
+                  <a:ext uri="{0D108BD9-81ED-4DB2-BD59-A6C34878D82A}">
+                    <a16:rowId xmlns:a16="http://schemas.microsoft.com/office/drawing/2014/main" val="1434357254"/>
+                  </a:ext>
+                </a:extLst>
+              </a:tr>
+              <a:tr h="441537">
+                <a:tc>
+                  <a:txBody>
+                    <a:bodyPr/>
+                    <a:lstStyle/>
+                    <a:p>
+                      <a:pPr marL="0" marR="0" lvl="0" indent="0" algn="l" defTabSz="914400" rtl="0" eaLnBrk="1" fontAlgn="auto" latinLnBrk="0" hangingPunct="1">
+                        <a:lnSpc>
+                          <a:spcPct val="100000"/>
+                        </a:lnSpc>
+                        <a:spcBef>
+                          <a:spcPts val="0"/>
+                        </a:spcBef>
+                        <a:spcAft>
+                          <a:spcPts val="0"/>
+                        </a:spcAft>
+                        <a:buClrTx/>
+                        <a:buSzTx/>
+                        <a:buFontTx/>
+                        <a:buNone/>
+                        <a:tabLst/>
+                        <a:defRPr/>
+                      </a:pPr>
+                      <a:r>
+                        <a:rPr lang="de-DE" sz="2100" dirty="0">
+                          <a:latin typeface="Arial" panose="020B0604020202020204" pitchFamily="34" charset="0"/>
+                          <a:cs typeface="Arial" panose="020B0604020202020204" pitchFamily="34" charset="0"/>
+                        </a:rPr>
+                        <a:t>Modelle erstellen</a:t>
+                      </a:r>
+                    </a:p>
+                  </a:txBody>
+                  <a:tcPr marL="108872" marR="108872" marT="54436" marB="54436" anchor="ctr"/>
+                </a:tc>
+                <a:tc>
+                  <a:txBody>
+                    <a:bodyPr/>
+                    <a:lstStyle/>
+                    <a:p>
+                      <a:pPr algn="r"/>
+                      <a:r>
+                        <a:rPr lang="de-DE" sz="2100" dirty="0">
+                          <a:latin typeface="Arial" panose="020B0604020202020204" pitchFamily="34" charset="0"/>
+                          <a:cs typeface="Arial" panose="020B0604020202020204" pitchFamily="34" charset="0"/>
+                        </a:rPr>
+                        <a:t>25.03.2020</a:t>
+                      </a:r>
+                    </a:p>
+                  </a:txBody>
+                  <a:tcPr marL="108872" marR="108872" marT="54436" marB="54436" anchor="ctr"/>
+                </a:tc>
+                <a:tc>
+                  <a:txBody>
+                    <a:bodyPr/>
+                    <a:lstStyle/>
+                    <a:p>
+                      <a:pPr algn="r"/>
+                      <a:r>
+                        <a:rPr lang="de-DE" sz="2100" dirty="0">
+                          <a:latin typeface="Arial" panose="020B0604020202020204" pitchFamily="34" charset="0"/>
+                          <a:cs typeface="Arial" panose="020B0604020202020204" pitchFamily="34" charset="0"/>
+                        </a:rPr>
+                        <a:t>-</a:t>
+                      </a:r>
                     </a:p>
                   </a:txBody>
                   <a:tcPr marL="108872" marR="108872" marT="54436" marB="54436" anchor="ctr"/>
@@ -14587,13 +15093,12 @@
                         <a:defRPr/>
                       </a:pPr>
                       <a:r>
-                        <a:rPr lang="de-DE" sz="2100" dirty="0"/>
+                        <a:rPr lang="de-DE" sz="2100" dirty="0">
+                          <a:latin typeface="Arial" panose="020B0604020202020204" pitchFamily="34" charset="0"/>
+                          <a:cs typeface="Arial" panose="020B0604020202020204" pitchFamily="34" charset="0"/>
+                        </a:rPr>
                         <a:t>Rest-API designen &amp; dokumentieren</a:t>
                       </a:r>
-                      <a:endParaRPr lang="de-DE" sz="2100" dirty="0">
-                        <a:latin typeface="Arial" panose="020B0604020202020204" pitchFamily="34" charset="0"/>
-                        <a:cs typeface="Arial" panose="020B0604020202020204" pitchFamily="34" charset="0"/>
-                      </a:endParaRPr>
                     </a:p>
                   </a:txBody>
                   <a:tcPr marL="108872" marR="108872" marT="54436" marB="54436" anchor="ctr"/>
@@ -14603,11 +15108,14 @@
                     <a:bodyPr/>
                     <a:lstStyle/>
                     <a:p>
-                      <a:pPr algn="l"/>
-                      <a:endParaRPr lang="de-DE" sz="2100" dirty="0">
-                        <a:latin typeface="Arial" panose="020B0604020202020204" pitchFamily="34" charset="0"/>
-                        <a:cs typeface="Arial" panose="020B0604020202020204" pitchFamily="34" charset="0"/>
-                      </a:endParaRPr>
+                      <a:pPr algn="r"/>
+                      <a:r>
+                        <a:rPr lang="de-DE" sz="2100" dirty="0">
+                          <a:latin typeface="Arial" panose="020B0604020202020204" pitchFamily="34" charset="0"/>
+                          <a:cs typeface="Arial" panose="020B0604020202020204" pitchFamily="34" charset="0"/>
+                        </a:rPr>
+                        <a:t>10.03.2020</a:t>
+                      </a:r>
                     </a:p>
                   </a:txBody>
                   <a:tcPr marL="108872" marR="108872" marT="54436" marB="54436" anchor="ctr"/>
@@ -14617,11 +15125,14 @@
                     <a:bodyPr/>
                     <a:lstStyle/>
                     <a:p>
-                      <a:pPr algn="l"/>
-                      <a:endParaRPr lang="de-DE" sz="2100" dirty="0">
-                        <a:latin typeface="Arial" panose="020B0604020202020204" pitchFamily="34" charset="0"/>
-                        <a:cs typeface="Arial" panose="020B0604020202020204" pitchFamily="34" charset="0"/>
-                      </a:endParaRPr>
+                      <a:pPr algn="r"/>
+                      <a:r>
+                        <a:rPr lang="de-DE" sz="2100" dirty="0">
+                          <a:latin typeface="Arial" panose="020B0604020202020204" pitchFamily="34" charset="0"/>
+                          <a:cs typeface="Arial" panose="020B0604020202020204" pitchFamily="34" charset="0"/>
+                        </a:rPr>
+                        <a:t>-</a:t>
+                      </a:r>
                     </a:p>
                   </a:txBody>
                   <a:tcPr marL="108872" marR="108872" marT="54436" marB="54436" anchor="ctr"/>
@@ -14656,13 +15167,12 @@
                         <a:defRPr/>
                       </a:pPr>
                       <a:r>
-                        <a:rPr lang="de-DE" sz="2100" dirty="0"/>
-                        <a:t>Rest-API implementieren </a:t>
+                        <a:rPr lang="de-DE" sz="2100" dirty="0">
+                          <a:latin typeface="Arial" panose="020B0604020202020204" pitchFamily="34" charset="0"/>
+                          <a:cs typeface="Arial" panose="020B0604020202020204" pitchFamily="34" charset="0"/>
+                        </a:rPr>
+                        <a:t>Frontend Entwicklung</a:t>
                       </a:r>
-                      <a:endParaRPr lang="de-DE" sz="2100" dirty="0">
-                        <a:latin typeface="Arial" panose="020B0604020202020204" pitchFamily="34" charset="0"/>
-                        <a:cs typeface="Arial" panose="020B0604020202020204" pitchFamily="34" charset="0"/>
-                      </a:endParaRPr>
                     </a:p>
                   </a:txBody>
                   <a:tcPr marL="108872" marR="108872" marT="54436" marB="54436" anchor="ctr"/>
@@ -14672,11 +15182,14 @@
                     <a:bodyPr/>
                     <a:lstStyle/>
                     <a:p>
-                      <a:pPr algn="l"/>
-                      <a:endParaRPr lang="de-DE" sz="2100" dirty="0">
-                        <a:latin typeface="Arial" panose="020B0604020202020204" pitchFamily="34" charset="0"/>
-                        <a:cs typeface="Arial" panose="020B0604020202020204" pitchFamily="34" charset="0"/>
-                      </a:endParaRPr>
+                      <a:pPr algn="r"/>
+                      <a:r>
+                        <a:rPr lang="de-DE" sz="2100" dirty="0">
+                          <a:latin typeface="Arial" panose="020B0604020202020204" pitchFamily="34" charset="0"/>
+                          <a:cs typeface="Arial" panose="020B0604020202020204" pitchFamily="34" charset="0"/>
+                        </a:rPr>
+                        <a:t>30.03.2020</a:t>
+                      </a:r>
                     </a:p>
                   </a:txBody>
                   <a:tcPr marL="108872" marR="108872" marT="54436" marB="54436" anchor="ctr"/>
@@ -14686,11 +15199,88 @@
                     <a:bodyPr/>
                     <a:lstStyle/>
                     <a:p>
-                      <a:pPr algn="l"/>
-                      <a:endParaRPr lang="de-DE" sz="2100" dirty="0">
-                        <a:latin typeface="Arial" panose="020B0604020202020204" pitchFamily="34" charset="0"/>
-                        <a:cs typeface="Arial" panose="020B0604020202020204" pitchFamily="34" charset="0"/>
-                      </a:endParaRPr>
+                      <a:pPr algn="r"/>
+                      <a:r>
+                        <a:rPr lang="de-DE" sz="2100" dirty="0">
+                          <a:latin typeface="Arial" panose="020B0604020202020204" pitchFamily="34" charset="0"/>
+                          <a:cs typeface="Arial" panose="020B0604020202020204" pitchFamily="34" charset="0"/>
+                        </a:rPr>
+                        <a:t>-</a:t>
+                      </a:r>
+                    </a:p>
+                  </a:txBody>
+                  <a:tcPr marL="108872" marR="108872" marT="54436" marB="54436" anchor="ctr"/>
+                </a:tc>
+                <a:extLst>
+                  <a:ext uri="{0D108BD9-81ED-4DB2-BD59-A6C34878D82A}">
+                    <a16:rowId xmlns:a16="http://schemas.microsoft.com/office/drawing/2014/main" val="571386387"/>
+                  </a:ext>
+                </a:extLst>
+              </a:tr>
+              <a:tr h="441537">
+                <a:tc>
+                  <a:txBody>
+                    <a:bodyPr/>
+                    <a:lstStyle/>
+                    <a:p>
+                      <a:pPr marL="0" marR="0" lvl="0" indent="0" algn="l" defTabSz="914400" rtl="0" eaLnBrk="1" fontAlgn="auto" latinLnBrk="0" hangingPunct="1">
+                        <a:lnSpc>
+                          <a:spcPct val="100000"/>
+                        </a:lnSpc>
+                        <a:spcBef>
+                          <a:spcPts val="0"/>
+                        </a:spcBef>
+                        <a:spcAft>
+                          <a:spcPts val="0"/>
+                        </a:spcAft>
+                        <a:buClrTx/>
+                        <a:buSzTx/>
+                        <a:buFontTx/>
+                        <a:buNone/>
+                        <a:tabLst/>
+                        <a:defRPr/>
+                      </a:pPr>
+                      <a:r>
+                        <a:rPr lang="de-DE" sz="2100" dirty="0">
+                          <a:latin typeface="Arial" panose="020B0604020202020204" pitchFamily="34" charset="0"/>
+                          <a:cs typeface="Arial" panose="020B0604020202020204" pitchFamily="34" charset="0"/>
+                        </a:rPr>
+                        <a:t>Rest-API implementieren </a:t>
+                      </a:r>
+                    </a:p>
+                  </a:txBody>
+                  <a:tcPr marL="108872" marR="108872" marT="54436" marB="54436" anchor="ctr"/>
+                </a:tc>
+                <a:tc>
+                  <a:txBody>
+                    <a:bodyPr/>
+                    <a:lstStyle/>
+                    <a:p>
+                      <a:pPr algn="r"/>
+                      <a:r>
+                        <a:rPr lang="de-DE" sz="2100" dirty="0">
+                          <a:latin typeface="Arial" panose="020B0604020202020204" pitchFamily="34" charset="0"/>
+                          <a:cs typeface="Arial" panose="020B0604020202020204" pitchFamily="34" charset="0"/>
+                        </a:rPr>
+                        <a:t>15.04.2020</a:t>
+                      </a:r>
+                    </a:p>
+                  </a:txBody>
+                  <a:tcPr marL="108872" marR="108872" marT="54436" marB="54436" anchor="ctr"/>
+                </a:tc>
+                <a:tc>
+                  <a:txBody>
+                    <a:bodyPr/>
+                    <a:lstStyle/>
+                    <a:p>
+                      <a:pPr algn="r"/>
+                      <a:r>
+                        <a:rPr lang="de-DE" sz="2100" dirty="0">
+                          <a:latin typeface="Arial" panose="020B0604020202020204" pitchFamily="34" charset="0"/>
+                          <a:cs typeface="Arial" panose="020B0604020202020204" pitchFamily="34" charset="0"/>
+                        </a:rPr>
+                        <a:t>-</a:t>
+                      </a:r>
                     </a:p>
                   </a:txBody>
                   <a:tcPr marL="108872" marR="108872" marT="54436" marB="54436" anchor="ctr"/>
@@ -14709,13 +15299,12 @@
                     <a:p>
                       <a:pPr algn="l"/>
                       <a:r>
-                        <a:rPr lang="de-DE" sz="2100" dirty="0"/>
+                        <a:rPr lang="de-DE" sz="2100" dirty="0">
+                          <a:latin typeface="Arial" panose="020B0604020202020204" pitchFamily="34" charset="0"/>
+                          <a:cs typeface="Arial" panose="020B0604020202020204" pitchFamily="34" charset="0"/>
+                        </a:rPr>
                         <a:t>Testen &amp; Debuggen</a:t>
                       </a:r>
-                      <a:endParaRPr lang="de-DE" sz="2100" dirty="0">
-                        <a:latin typeface="Arial" panose="020B0604020202020204" pitchFamily="34" charset="0"/>
-                        <a:cs typeface="Arial" panose="020B0604020202020204" pitchFamily="34" charset="0"/>
-                      </a:endParaRPr>
                     </a:p>
                   </a:txBody>
                   <a:tcPr marL="108872" marR="108872" marT="54436" marB="54436" anchor="ctr"/>
@@ -14725,11 +15314,14 @@
                     <a:bodyPr/>
                     <a:lstStyle/>
                     <a:p>
-                      <a:pPr algn="l"/>
-                      <a:endParaRPr lang="de-DE" sz="2100" dirty="0">
-                        <a:latin typeface="Arial" panose="020B0604020202020204" pitchFamily="34" charset="0"/>
-                        <a:cs typeface="Arial" panose="020B0604020202020204" pitchFamily="34" charset="0"/>
-                      </a:endParaRPr>
+                      <a:pPr algn="r"/>
+                      <a:r>
+                        <a:rPr lang="de-DE" sz="2100" dirty="0">
+                          <a:latin typeface="Arial" panose="020B0604020202020204" pitchFamily="34" charset="0"/>
+                          <a:cs typeface="Arial" panose="020B0604020202020204" pitchFamily="34" charset="0"/>
+                        </a:rPr>
+                        <a:t>05.05.2020</a:t>
+                      </a:r>
                     </a:p>
                   </a:txBody>
                   <a:tcPr marL="108872" marR="108872" marT="54436" marB="54436" anchor="ctr"/>
@@ -14739,11 +15331,14 @@
                     <a:bodyPr/>
                     <a:lstStyle/>
                     <a:p>
-                      <a:pPr algn="l"/>
-                      <a:endParaRPr lang="de-DE" sz="2100" dirty="0">
-                        <a:latin typeface="Arial" panose="020B0604020202020204" pitchFamily="34" charset="0"/>
-                        <a:cs typeface="Arial" panose="020B0604020202020204" pitchFamily="34" charset="0"/>
-                      </a:endParaRPr>
+                      <a:pPr algn="r"/>
+                      <a:r>
+                        <a:rPr lang="de-DE" sz="2100" dirty="0">
+                          <a:latin typeface="Arial" panose="020B0604020202020204" pitchFamily="34" charset="0"/>
+                          <a:cs typeface="Arial" panose="020B0604020202020204" pitchFamily="34" charset="0"/>
+                        </a:rPr>
+                        <a:t>-</a:t>
+                      </a:r>
                     </a:p>
                   </a:txBody>
                   <a:tcPr marL="108872" marR="108872" marT="54436" marB="54436" anchor="ctr"/>
@@ -14804,13 +15399,13 @@
   <p:clrMapOvr>
     <a:masterClrMapping/>
   </p:clrMapOvr>
-  <mc:AlternateContent xmlns:mc="http://schemas.openxmlformats.org/markup-compatibility/2006">
-    <mc:Choice xmlns:p159="http://schemas.microsoft.com/office/powerpoint/2015/09/main" Requires="p159">
+  <mc:AlternateContent xmlns:mc="http://schemas.openxmlformats.org/markup-compatibility/2006" xmlns:p159="http://schemas.microsoft.com/office/powerpoint/2015/09/main">
+    <mc:Choice Requires="p159">
       <p:transition xmlns:p14="http://schemas.microsoft.com/office/powerpoint/2010/main" spd="slow" p14:dur="2000">
         <p159:morph option="byObject"/>
       </p:transition>
     </mc:Choice>
-    <mc:Fallback>
+    <mc:Fallback xmlns="">
       <p:transition spd="slow">
         <p:fade/>
       </p:transition>
@@ -14895,7 +15490,21 @@
                 <a:latin typeface="Arial" panose="020B0604020202020204" pitchFamily="34" charset="0"/>
                 <a:cs typeface="Arial" panose="020B0604020202020204" pitchFamily="34" charset="0"/>
               </a:rPr>
-              <a:t>Dokumente abgeschlossen				00.00.0000</a:t>
+              <a:t>Dokumente abgeschlossen				</a:t>
+            </a:r>
+            <a:r>
+              <a:rPr lang="de-DE" dirty="0">
+                <a:latin typeface="Arial" panose="020B0604020202020204" pitchFamily="34" charset="0"/>
+                <a:cs typeface="Arial" panose="020B0604020202020204" pitchFamily="34" charset="0"/>
+              </a:rPr>
+              <a:t>26</a:t>
+            </a:r>
+            <a:r>
+              <a:rPr lang="de-DE" sz="2400" dirty="0">
+                <a:latin typeface="Arial" panose="020B0604020202020204" pitchFamily="34" charset="0"/>
+                <a:cs typeface="Arial" panose="020B0604020202020204" pitchFamily="34" charset="0"/>
+              </a:rPr>
+              <a:t>.03.2020</a:t>
             </a:r>
           </a:p>
           <a:p>
@@ -14911,14 +15520,14 @@
                 <a:latin typeface="Arial" panose="020B0604020202020204" pitchFamily="34" charset="0"/>
                 <a:cs typeface="Arial" panose="020B0604020202020204" pitchFamily="34" charset="0"/>
               </a:rPr>
-              <a:t>00</a:t>
+              <a:t>15</a:t>
             </a:r>
             <a:r>
               <a:rPr lang="de-DE" sz="2400" dirty="0">
                 <a:latin typeface="Arial" panose="020B0604020202020204" pitchFamily="34" charset="0"/>
                 <a:cs typeface="Arial" panose="020B0604020202020204" pitchFamily="34" charset="0"/>
               </a:rPr>
-              <a:t>.00.0000</a:t>
+              <a:t>.04.2020</a:t>
             </a:r>
           </a:p>
           <a:p>
@@ -14927,21 +15536,7 @@
                 <a:latin typeface="Arial" panose="020B0604020202020204" pitchFamily="34" charset="0"/>
                 <a:cs typeface="Arial" panose="020B0604020202020204" pitchFamily="34" charset="0"/>
               </a:rPr>
-              <a:t>Feinentwicklung abgeschlossen				</a:t>
-            </a:r>
-            <a:r>
-              <a:rPr lang="de-DE" dirty="0">
-                <a:latin typeface="Arial" panose="020B0604020202020204" pitchFamily="34" charset="0"/>
-                <a:cs typeface="Arial" panose="020B0604020202020204" pitchFamily="34" charset="0"/>
-              </a:rPr>
-              <a:t>00</a:t>
-            </a:r>
-            <a:r>
-              <a:rPr lang="de-DE" sz="2400" dirty="0">
-                <a:latin typeface="Arial" panose="020B0604020202020204" pitchFamily="34" charset="0"/>
-                <a:cs typeface="Arial" panose="020B0604020202020204" pitchFamily="34" charset="0"/>
-              </a:rPr>
-              <a:t>.00.0000</a:t>
+              <a:t>Feinentwicklung abgeschlossen				25.04.2020</a:t>
             </a:r>
           </a:p>
           <a:p>
@@ -14957,14 +15552,14 @@
                 <a:latin typeface="Arial" panose="020B0604020202020204" pitchFamily="34" charset="0"/>
                 <a:cs typeface="Arial" panose="020B0604020202020204" pitchFamily="34" charset="0"/>
               </a:rPr>
-              <a:t>00</a:t>
+              <a:t>05</a:t>
             </a:r>
             <a:r>
               <a:rPr lang="de-DE" sz="2400" dirty="0">
                 <a:latin typeface="Arial" panose="020B0604020202020204" pitchFamily="34" charset="0"/>
                 <a:cs typeface="Arial" panose="020B0604020202020204" pitchFamily="34" charset="0"/>
               </a:rPr>
-              <a:t>.00.0000</a:t>
+              <a:t>.05.2020</a:t>
             </a:r>
           </a:p>
           <a:p>
@@ -14980,14 +15575,14 @@
                 <a:latin typeface="Arial" panose="020B0604020202020204" pitchFamily="34" charset="0"/>
                 <a:cs typeface="Arial" panose="020B0604020202020204" pitchFamily="34" charset="0"/>
               </a:rPr>
-              <a:t>00</a:t>
+              <a:t>07</a:t>
             </a:r>
             <a:r>
               <a:rPr lang="de-DE" sz="2400" dirty="0">
                 <a:latin typeface="Arial" panose="020B0604020202020204" pitchFamily="34" charset="0"/>
                 <a:cs typeface="Arial" panose="020B0604020202020204" pitchFamily="34" charset="0"/>
               </a:rPr>
-              <a:t>.00.0000</a:t>
+              <a:t>.05.2020</a:t>
             </a:r>
           </a:p>
           <a:p>
@@ -15044,13 +15639,13 @@
   <p:clrMapOvr>
     <a:masterClrMapping/>
   </p:clrMapOvr>
-  <mc:AlternateContent xmlns:mc="http://schemas.openxmlformats.org/markup-compatibility/2006">
-    <mc:Choice xmlns:p159="http://schemas.microsoft.com/office/powerpoint/2015/09/main" Requires="p159">
+  <mc:AlternateContent xmlns:mc="http://schemas.openxmlformats.org/markup-compatibility/2006" xmlns:p159="http://schemas.microsoft.com/office/powerpoint/2015/09/main">
+    <mc:Choice Requires="p159">
       <p:transition xmlns:p14="http://schemas.microsoft.com/office/powerpoint/2010/main" spd="slow" p14:dur="2000">
         <p159:morph option="byObject"/>
       </p:transition>
     </mc:Choice>
-    <mc:Fallback>
+    <mc:Fallback xmlns="">
       <p:transition spd="slow">
         <p:fade/>
       </p:transition>
@@ -15119,7 +15714,7 @@
           <p:nvPr>
             <p:extLst>
               <p:ext uri="{D42A27DB-BD31-4B8C-83A1-F6EECF244321}">
-                <p14:modId xmlns:p14="http://schemas.microsoft.com/office/powerpoint/2010/main" val="2509423767"/>
+                <p14:modId xmlns:p14="http://schemas.microsoft.com/office/powerpoint/2010/main" val="3641840248"/>
               </p:ext>
             </p:extLst>
           </p:nvPr>
@@ -15203,10 +15798,10 @@
                     <a:p>
                       <a:pPr algn="ctr"/>
                       <a:r>
-                        <a:rPr lang="de-DE"/>
-                        <a:t>Adjustierung (in Stunden)</a:t>
+                        <a:rPr lang="de-DE" dirty="0"/>
+                        <a:t>Neue Schätzung (in Stunden)</a:t>
                       </a:r>
-                      <a:endParaRPr lang="de-DE">
+                      <a:endParaRPr lang="de-DE" dirty="0">
                         <a:latin typeface="Arial" panose="020B0604020202020204" pitchFamily="34" charset="0"/>
                         <a:cs typeface="Arial" panose="020B0604020202020204" pitchFamily="34" charset="0"/>
                       </a:endParaRPr>
@@ -15262,10 +15857,13 @@
                     <a:lstStyle/>
                     <a:p>
                       <a:pPr algn="r"/>
-                      <a:endParaRPr lang="de-DE" sz="2000" dirty="0">
-                        <a:latin typeface="Arial" panose="020B0604020202020204" pitchFamily="34" charset="0"/>
-                        <a:cs typeface="Arial" panose="020B0604020202020204" pitchFamily="34" charset="0"/>
-                      </a:endParaRPr>
+                      <a:r>
+                        <a:rPr lang="de-DE" sz="2000" dirty="0">
+                          <a:latin typeface="Arial" panose="020B0604020202020204" pitchFamily="34" charset="0"/>
+                          <a:cs typeface="Arial" panose="020B0604020202020204" pitchFamily="34" charset="0"/>
+                        </a:rPr>
+                        <a:t>10</a:t>
+                      </a:r>
                     </a:p>
                   </a:txBody>
                   <a:tcPr/>
@@ -15276,10 +15874,13 @@
                     <a:lstStyle/>
                     <a:p>
                       <a:pPr algn="r"/>
-                      <a:endParaRPr lang="de-DE" sz="2000" dirty="0">
-                        <a:latin typeface="Arial" panose="020B0604020202020204" pitchFamily="34" charset="0"/>
-                        <a:cs typeface="Arial" panose="020B0604020202020204" pitchFamily="34" charset="0"/>
-                      </a:endParaRPr>
+                      <a:r>
+                        <a:rPr lang="de-DE" sz="2000" dirty="0">
+                          <a:latin typeface="Arial" panose="020B0604020202020204" pitchFamily="34" charset="0"/>
+                          <a:cs typeface="Arial" panose="020B0604020202020204" pitchFamily="34" charset="0"/>
+                        </a:rPr>
+                        <a:t>8</a:t>
+                      </a:r>
                     </a:p>
                   </a:txBody>
                   <a:tcPr/>
@@ -15290,10 +15891,13 @@
                     <a:lstStyle/>
                     <a:p>
                       <a:pPr algn="r"/>
-                      <a:endParaRPr lang="de-DE" sz="2000" dirty="0">
-                        <a:latin typeface="Arial" panose="020B0604020202020204" pitchFamily="34" charset="0"/>
-                        <a:cs typeface="Arial" panose="020B0604020202020204" pitchFamily="34" charset="0"/>
-                      </a:endParaRPr>
+                      <a:r>
+                        <a:rPr lang="de-DE" sz="2000" dirty="0">
+                          <a:latin typeface="Arial" panose="020B0604020202020204" pitchFamily="34" charset="0"/>
+                          <a:cs typeface="Arial" panose="020B0604020202020204" pitchFamily="34" charset="0"/>
+                        </a:rPr>
+                        <a:t>7</a:t>
+                      </a:r>
                     </a:p>
                   </a:txBody>
                   <a:tcPr/>
@@ -15328,10 +15932,13 @@
                     <a:lstStyle/>
                     <a:p>
                       <a:pPr algn="r"/>
-                      <a:endParaRPr lang="de-DE" sz="2000" dirty="0">
-                        <a:latin typeface="Arial" panose="020B0604020202020204" pitchFamily="34" charset="0"/>
-                        <a:cs typeface="Arial" panose="020B0604020202020204" pitchFamily="34" charset="0"/>
-                      </a:endParaRPr>
+                      <a:r>
+                        <a:rPr lang="de-DE" sz="2000" dirty="0">
+                          <a:latin typeface="Arial" panose="020B0604020202020204" pitchFamily="34" charset="0"/>
+                          <a:cs typeface="Arial" panose="020B0604020202020204" pitchFamily="34" charset="0"/>
+                        </a:rPr>
+                        <a:t>100</a:t>
+                      </a:r>
                     </a:p>
                   </a:txBody>
                   <a:tcPr/>
@@ -15342,10 +15949,13 @@
                     <a:lstStyle/>
                     <a:p>
                       <a:pPr algn="r"/>
-                      <a:endParaRPr lang="de-DE" sz="2000" dirty="0">
-                        <a:latin typeface="Arial" panose="020B0604020202020204" pitchFamily="34" charset="0"/>
-                        <a:cs typeface="Arial" panose="020B0604020202020204" pitchFamily="34" charset="0"/>
-                      </a:endParaRPr>
+                      <a:r>
+                        <a:rPr lang="de-DE" sz="2000" dirty="0">
+                          <a:latin typeface="Arial" panose="020B0604020202020204" pitchFamily="34" charset="0"/>
+                          <a:cs typeface="Arial" panose="020B0604020202020204" pitchFamily="34" charset="0"/>
+                        </a:rPr>
+                        <a:t>120</a:t>
+                      </a:r>
                     </a:p>
                   </a:txBody>
                   <a:tcPr/>
@@ -15356,10 +15966,13 @@
                     <a:lstStyle/>
                     <a:p>
                       <a:pPr algn="r"/>
-                      <a:endParaRPr lang="de-DE" sz="2000" dirty="0">
-                        <a:latin typeface="Arial" panose="020B0604020202020204" pitchFamily="34" charset="0"/>
-                        <a:cs typeface="Arial" panose="020B0604020202020204" pitchFamily="34" charset="0"/>
-                      </a:endParaRPr>
+                      <a:r>
+                        <a:rPr lang="de-DE" sz="2000" dirty="0">
+                          <a:latin typeface="Arial" panose="020B0604020202020204" pitchFamily="34" charset="0"/>
+                          <a:cs typeface="Arial" panose="020B0604020202020204" pitchFamily="34" charset="0"/>
+                        </a:rPr>
+                        <a:t>40</a:t>
+                      </a:r>
                     </a:p>
                   </a:txBody>
                   <a:tcPr/>
@@ -15394,10 +16007,13 @@
                     <a:lstStyle/>
                     <a:p>
                       <a:pPr algn="r"/>
-                      <a:endParaRPr lang="de-DE" sz="2000" dirty="0">
-                        <a:latin typeface="Arial" panose="020B0604020202020204" pitchFamily="34" charset="0"/>
-                        <a:cs typeface="Arial" panose="020B0604020202020204" pitchFamily="34" charset="0"/>
-                      </a:endParaRPr>
+                      <a:r>
+                        <a:rPr lang="de-DE" sz="2000" dirty="0">
+                          <a:latin typeface="Arial" panose="020B0604020202020204" pitchFamily="34" charset="0"/>
+                          <a:cs typeface="Arial" panose="020B0604020202020204" pitchFamily="34" charset="0"/>
+                        </a:rPr>
+                        <a:t>40</a:t>
+                      </a:r>
                     </a:p>
                   </a:txBody>
                   <a:tcPr/>
@@ -15408,10 +16024,13 @@
                     <a:lstStyle/>
                     <a:p>
                       <a:pPr algn="r"/>
-                      <a:endParaRPr lang="de-DE" sz="2000" dirty="0">
-                        <a:latin typeface="Arial" panose="020B0604020202020204" pitchFamily="34" charset="0"/>
-                        <a:cs typeface="Arial" panose="020B0604020202020204" pitchFamily="34" charset="0"/>
-                      </a:endParaRPr>
+                      <a:r>
+                        <a:rPr lang="de-DE" sz="2000" dirty="0">
+                          <a:latin typeface="Arial" panose="020B0604020202020204" pitchFamily="34" charset="0"/>
+                          <a:cs typeface="Arial" panose="020B0604020202020204" pitchFamily="34" charset="0"/>
+                        </a:rPr>
+                        <a:t>50</a:t>
+                      </a:r>
                     </a:p>
                   </a:txBody>
                   <a:tcPr/>
@@ -15422,10 +16041,13 @@
                     <a:lstStyle/>
                     <a:p>
                       <a:pPr algn="r"/>
-                      <a:endParaRPr lang="de-DE" sz="2000" dirty="0">
-                        <a:latin typeface="Arial" panose="020B0604020202020204" pitchFamily="34" charset="0"/>
-                        <a:cs typeface="Arial" panose="020B0604020202020204" pitchFamily="34" charset="0"/>
-                      </a:endParaRPr>
+                      <a:r>
+                        <a:rPr lang="de-DE" sz="2000" dirty="0">
+                          <a:latin typeface="Arial" panose="020B0604020202020204" pitchFamily="34" charset="0"/>
+                          <a:cs typeface="Arial" panose="020B0604020202020204" pitchFamily="34" charset="0"/>
+                        </a:rPr>
+                        <a:t>-</a:t>
+                      </a:r>
                     </a:p>
                   </a:txBody>
                   <a:tcPr/>
@@ -15460,10 +16082,13 @@
                     <a:lstStyle/>
                     <a:p>
                       <a:pPr algn="r"/>
-                      <a:endParaRPr lang="de-DE" sz="2000" dirty="0">
-                        <a:latin typeface="Arial" panose="020B0604020202020204" pitchFamily="34" charset="0"/>
-                        <a:cs typeface="Arial" panose="020B0604020202020204" pitchFamily="34" charset="0"/>
-                      </a:endParaRPr>
+                      <a:r>
+                        <a:rPr lang="de-DE" sz="2000" dirty="0">
+                          <a:latin typeface="Arial" panose="020B0604020202020204" pitchFamily="34" charset="0"/>
+                          <a:cs typeface="Arial" panose="020B0604020202020204" pitchFamily="34" charset="0"/>
+                        </a:rPr>
+                        <a:t>60</a:t>
+                      </a:r>
                     </a:p>
                   </a:txBody>
                   <a:tcPr/>
@@ -15474,10 +16099,13 @@
                     <a:lstStyle/>
                     <a:p>
                       <a:pPr algn="r"/>
-                      <a:endParaRPr lang="de-DE" sz="2000" dirty="0">
-                        <a:latin typeface="Arial" panose="020B0604020202020204" pitchFamily="34" charset="0"/>
-                        <a:cs typeface="Arial" panose="020B0604020202020204" pitchFamily="34" charset="0"/>
-                      </a:endParaRPr>
+                      <a:r>
+                        <a:rPr lang="de-DE" sz="2000" dirty="0">
+                          <a:latin typeface="Arial" panose="020B0604020202020204" pitchFamily="34" charset="0"/>
+                          <a:cs typeface="Arial" panose="020B0604020202020204" pitchFamily="34" charset="0"/>
+                        </a:rPr>
+                        <a:t>50</a:t>
+                      </a:r>
                     </a:p>
                   </a:txBody>
                   <a:tcPr/>
@@ -15488,10 +16116,13 @@
                     <a:lstStyle/>
                     <a:p>
                       <a:pPr algn="r"/>
-                      <a:endParaRPr lang="de-DE" sz="2000" dirty="0">
-                        <a:latin typeface="Arial" panose="020B0604020202020204" pitchFamily="34" charset="0"/>
-                        <a:cs typeface="Arial" panose="020B0604020202020204" pitchFamily="34" charset="0"/>
-                      </a:endParaRPr>
+                      <a:r>
+                        <a:rPr lang="de-DE" sz="2000" dirty="0">
+                          <a:latin typeface="Arial" panose="020B0604020202020204" pitchFamily="34" charset="0"/>
+                          <a:cs typeface="Arial" panose="020B0604020202020204" pitchFamily="34" charset="0"/>
+                        </a:rPr>
+                        <a:t>-</a:t>
+                      </a:r>
                     </a:p>
                   </a:txBody>
                   <a:tcPr/>
@@ -15526,10 +16157,13 @@
                     <a:lstStyle/>
                     <a:p>
                       <a:pPr algn="r"/>
-                      <a:endParaRPr lang="de-DE" sz="2000" dirty="0">
-                        <a:latin typeface="Arial" panose="020B0604020202020204" pitchFamily="34" charset="0"/>
-                        <a:cs typeface="Arial" panose="020B0604020202020204" pitchFamily="34" charset="0"/>
-                      </a:endParaRPr>
+                      <a:r>
+                        <a:rPr lang="de-DE" sz="2000" dirty="0">
+                          <a:latin typeface="Arial" panose="020B0604020202020204" pitchFamily="34" charset="0"/>
+                          <a:cs typeface="Arial" panose="020B0604020202020204" pitchFamily="34" charset="0"/>
+                        </a:rPr>
+                        <a:t>20</a:t>
+                      </a:r>
                     </a:p>
                   </a:txBody>
                   <a:tcPr/>
@@ -15540,10 +16174,13 @@
                     <a:lstStyle/>
                     <a:p>
                       <a:pPr algn="r"/>
-                      <a:endParaRPr lang="de-DE" sz="2000" dirty="0">
-                        <a:latin typeface="Arial" panose="020B0604020202020204" pitchFamily="34" charset="0"/>
-                        <a:cs typeface="Arial" panose="020B0604020202020204" pitchFamily="34" charset="0"/>
-                      </a:endParaRPr>
+                      <a:r>
+                        <a:rPr lang="de-DE" sz="2000" dirty="0">
+                          <a:latin typeface="Arial" panose="020B0604020202020204" pitchFamily="34" charset="0"/>
+                          <a:cs typeface="Arial" panose="020B0604020202020204" pitchFamily="34" charset="0"/>
+                        </a:rPr>
+                        <a:t>10</a:t>
+                      </a:r>
                     </a:p>
                   </a:txBody>
                   <a:tcPr/>
@@ -15554,10 +16191,13 @@
                     <a:lstStyle/>
                     <a:p>
                       <a:pPr algn="r"/>
-                      <a:endParaRPr lang="de-DE" sz="2000" dirty="0">
-                        <a:latin typeface="Arial" panose="020B0604020202020204" pitchFamily="34" charset="0"/>
-                        <a:cs typeface="Arial" panose="020B0604020202020204" pitchFamily="34" charset="0"/>
-                      </a:endParaRPr>
+                      <a:r>
+                        <a:rPr lang="de-DE" sz="2000" dirty="0">
+                          <a:latin typeface="Arial" panose="020B0604020202020204" pitchFamily="34" charset="0"/>
+                          <a:cs typeface="Arial" panose="020B0604020202020204" pitchFamily="34" charset="0"/>
+                        </a:rPr>
+                        <a:t>-</a:t>
+                      </a:r>
                     </a:p>
                   </a:txBody>
                   <a:tcPr/>
@@ -15592,10 +16232,13 @@
                     <a:lstStyle/>
                     <a:p>
                       <a:pPr algn="r"/>
-                      <a:endParaRPr lang="de-DE" sz="2000" dirty="0">
-                        <a:latin typeface="Arial" panose="020B0604020202020204" pitchFamily="34" charset="0"/>
-                        <a:cs typeface="Arial" panose="020B0604020202020204" pitchFamily="34" charset="0"/>
-                      </a:endParaRPr>
+                      <a:r>
+                        <a:rPr lang="de-DE" sz="2000" dirty="0">
+                          <a:latin typeface="Arial" panose="020B0604020202020204" pitchFamily="34" charset="0"/>
+                          <a:cs typeface="Arial" panose="020B0604020202020204" pitchFamily="34" charset="0"/>
+                        </a:rPr>
+                        <a:t>230</a:t>
+                      </a:r>
                     </a:p>
                   </a:txBody>
                   <a:tcPr/>
@@ -15606,10 +16249,13 @@
                     <a:lstStyle/>
                     <a:p>
                       <a:pPr algn="r"/>
-                      <a:endParaRPr lang="de-DE" sz="2000" dirty="0">
-                        <a:latin typeface="Arial" panose="020B0604020202020204" pitchFamily="34" charset="0"/>
-                        <a:cs typeface="Arial" panose="020B0604020202020204" pitchFamily="34" charset="0"/>
-                      </a:endParaRPr>
+                      <a:r>
+                        <a:rPr lang="de-DE" sz="2000" dirty="0">
+                          <a:latin typeface="Arial" panose="020B0604020202020204" pitchFamily="34" charset="0"/>
+                          <a:cs typeface="Arial" panose="020B0604020202020204" pitchFamily="34" charset="0"/>
+                        </a:rPr>
+                        <a:t>238</a:t>
+                      </a:r>
                     </a:p>
                   </a:txBody>
                   <a:tcPr/>
@@ -15620,10 +16266,13 @@
                     <a:lstStyle/>
                     <a:p>
                       <a:pPr algn="r"/>
-                      <a:endParaRPr lang="de-DE" sz="2000" dirty="0">
-                        <a:latin typeface="Arial" panose="020B0604020202020204" pitchFamily="34" charset="0"/>
-                        <a:cs typeface="Arial" panose="020B0604020202020204" pitchFamily="34" charset="0"/>
-                      </a:endParaRPr>
+                      <a:r>
+                        <a:rPr lang="de-DE" sz="2000" dirty="0">
+                          <a:latin typeface="Arial" panose="020B0604020202020204" pitchFamily="34" charset="0"/>
+                          <a:cs typeface="Arial" panose="020B0604020202020204" pitchFamily="34" charset="0"/>
+                        </a:rPr>
+                        <a:t>47</a:t>
+                      </a:r>
                     </a:p>
                   </a:txBody>
                   <a:tcPr/>
@@ -15684,13 +16333,13 @@
   <p:clrMapOvr>
     <a:masterClrMapping/>
   </p:clrMapOvr>
-  <mc:AlternateContent xmlns:mc="http://schemas.openxmlformats.org/markup-compatibility/2006">
-    <mc:Choice xmlns:p159="http://schemas.microsoft.com/office/powerpoint/2015/09/main" Requires="p159">
+  <mc:AlternateContent xmlns:mc="http://schemas.openxmlformats.org/markup-compatibility/2006" xmlns:p159="http://schemas.microsoft.com/office/powerpoint/2015/09/main">
+    <mc:Choice Requires="p159">
       <p:transition xmlns:p14="http://schemas.microsoft.com/office/powerpoint/2010/main" spd="slow" p14:dur="2000">
         <p159:morph option="byObject"/>
       </p:transition>
     </mc:Choice>
-    <mc:Fallback>
+    <mc:Fallback xmlns="">
       <p:transition spd="slow">
         <p:fade/>
       </p:transition>
@@ -15781,35 +16430,61 @@
                 <a:latin typeface="Arial" panose="020B0604020202020204" pitchFamily="34" charset="0"/>
                 <a:cs typeface="Arial" panose="020B0604020202020204" pitchFamily="34" charset="0"/>
               </a:rPr>
-              <a:t>Dokumente								%</a:t>
+              <a:t>Dokumente								100%</a:t>
             </a:r>
           </a:p>
           <a:p>
             <a:pPr fontAlgn="t"/>
             <a:r>
-              <a:rPr lang="de-DE" sz="2400" dirty="0"/>
-              <a:t>Grobentwicklung							%</a:t>
+              <a:rPr lang="de-DE" sz="2400" dirty="0">
+                <a:latin typeface="Arial" panose="020B0604020202020204" pitchFamily="34" charset="0"/>
+                <a:cs typeface="Arial" panose="020B0604020202020204" pitchFamily="34" charset="0"/>
+              </a:rPr>
+              <a:t>Grobentwicklung							30%</a:t>
             </a:r>
           </a:p>
           <a:p>
             <a:pPr fontAlgn="t"/>
             <a:r>
-              <a:rPr lang="de-DE" sz="2400" dirty="0"/>
-              <a:t>Feinentwicklung							%</a:t>
+              <a:rPr lang="de-DE" sz="2400" dirty="0">
+                <a:latin typeface="Arial" panose="020B0604020202020204" pitchFamily="34" charset="0"/>
+                <a:cs typeface="Arial" panose="020B0604020202020204" pitchFamily="34" charset="0"/>
+              </a:rPr>
+              <a:t>Feinentwicklung							0%</a:t>
             </a:r>
           </a:p>
           <a:p>
             <a:pPr fontAlgn="t"/>
             <a:r>
-              <a:rPr lang="de-DE" sz="2400" dirty="0"/>
-              <a:t>Testing &amp; Debugging						%</a:t>
+              <a:rPr lang="de-DE" sz="2400" dirty="0">
+                <a:latin typeface="Arial" panose="020B0604020202020204" pitchFamily="34" charset="0"/>
+                <a:cs typeface="Arial" panose="020B0604020202020204" pitchFamily="34" charset="0"/>
+              </a:rPr>
+              <a:t>Testing &amp; Debugging						0%</a:t>
             </a:r>
           </a:p>
           <a:p>
             <a:pPr fontAlgn="t"/>
             <a:r>
-              <a:rPr lang="de-DE" sz="2400" dirty="0"/>
-              <a:t>Abgabe								%</a:t>
+              <a:rPr lang="de-DE" sz="2400" dirty="0">
+                <a:latin typeface="Arial" panose="020B0604020202020204" pitchFamily="34" charset="0"/>
+                <a:cs typeface="Arial" panose="020B0604020202020204" pitchFamily="34" charset="0"/>
+              </a:rPr>
+              <a:t>Abgabe								</a:t>
+            </a:r>
+            <a:r>
+              <a:rPr lang="de-DE" dirty="0">
+                <a:latin typeface="Arial" panose="020B0604020202020204" pitchFamily="34" charset="0"/>
+                <a:cs typeface="Arial" panose="020B0604020202020204" pitchFamily="34" charset="0"/>
+              </a:rPr>
+              <a:t>5</a:t>
+            </a:r>
+            <a:r>
+              <a:rPr lang="de-DE" sz="2400" dirty="0">
+                <a:latin typeface="Arial" panose="020B0604020202020204" pitchFamily="34" charset="0"/>
+                <a:cs typeface="Arial" panose="020B0604020202020204" pitchFamily="34" charset="0"/>
+              </a:rPr>
+              <a:t>%</a:t>
             </a:r>
           </a:p>
           <a:p>
@@ -15866,13 +16541,13 @@
   <p:clrMapOvr>
     <a:masterClrMapping/>
   </p:clrMapOvr>
-  <mc:AlternateContent xmlns:mc="http://schemas.openxmlformats.org/markup-compatibility/2006">
-    <mc:Choice xmlns:p159="http://schemas.microsoft.com/office/powerpoint/2015/09/main" Requires="p159">
+  <mc:AlternateContent xmlns:mc="http://schemas.openxmlformats.org/markup-compatibility/2006" xmlns:p159="http://schemas.microsoft.com/office/powerpoint/2015/09/main">
+    <mc:Choice Requires="p159">
       <p:transition xmlns:p14="http://schemas.microsoft.com/office/powerpoint/2010/main" spd="slow" p14:dur="2000">
         <p159:morph option="byObject"/>
       </p:transition>
     </mc:Choice>
-    <mc:Fallback>
+    <mc:Fallback xmlns="">
       <p:transition spd="slow">
         <p:fade/>
       </p:transition>

</xml_diff>